<commit_message>
faulty screenshots and moreeee
</commit_message>
<xml_diff>
--- a/CS-6222/Fall_2018/project/Smart City Security - Attack and Defense Strategems.pptx
+++ b/CS-6222/Fall_2018/project/Smart City Security - Attack and Defense Strategems.pptx
@@ -5,21 +5,29 @@
     <p:sldMasterId id="2147483696" r:id="rId1"/>
   </p:sldMasterIdLst>
   <p:notesMasterIdLst>
-    <p:notesMasterId r:id="rId14"/>
+    <p:notesMasterId r:id="rId19"/>
   </p:notesMasterIdLst>
+  <p:handoutMasterIdLst>
+    <p:handoutMasterId r:id="rId20"/>
+  </p:handoutMasterIdLst>
   <p:sldIdLst>
     <p:sldId id="256" r:id="rId2"/>
     <p:sldId id="257" r:id="rId3"/>
     <p:sldId id="258" r:id="rId4"/>
     <p:sldId id="259" r:id="rId5"/>
     <p:sldId id="260" r:id="rId6"/>
-    <p:sldId id="261" r:id="rId7"/>
-    <p:sldId id="262" r:id="rId8"/>
-    <p:sldId id="263" r:id="rId9"/>
-    <p:sldId id="264" r:id="rId10"/>
-    <p:sldId id="265" r:id="rId11"/>
-    <p:sldId id="266" r:id="rId12"/>
-    <p:sldId id="267" r:id="rId13"/>
+    <p:sldId id="272" r:id="rId7"/>
+    <p:sldId id="261" r:id="rId8"/>
+    <p:sldId id="262" r:id="rId9"/>
+    <p:sldId id="271" r:id="rId10"/>
+    <p:sldId id="269" r:id="rId11"/>
+    <p:sldId id="263" r:id="rId12"/>
+    <p:sldId id="273" r:id="rId13"/>
+    <p:sldId id="270" r:id="rId14"/>
+    <p:sldId id="264" r:id="rId15"/>
+    <p:sldId id="265" r:id="rId16"/>
+    <p:sldId id="266" r:id="rId17"/>
+    <p:sldId id="267" r:id="rId18"/>
   </p:sldIdLst>
   <p:sldSz cx="12192000" cy="6858000"/>
   <p:notesSz cx="6858000" cy="9144000"/>
@@ -119,6 +127,195 @@
     </a:lvl9pPr>
   </p:defaultTextStyle>
 </p:presentation>
+</file>
+
+<file path=ppt/handoutMasters/handoutMaster1.xml><?xml version="1.0" encoding="utf-8"?>
+<p:handoutMaster xmlns:a="http://schemas.openxmlformats.org/drawingml/2006/main" xmlns:r="http://schemas.openxmlformats.org/officeDocument/2006/relationships" xmlns:p="http://schemas.openxmlformats.org/presentationml/2006/main">
+  <p:cSld>
+    <p:bg>
+      <p:bgRef idx="1001">
+        <a:schemeClr val="bg1"/>
+      </p:bgRef>
+    </p:bg>
+    <p:spTree>
+      <p:nvGrpSpPr>
+        <p:cNvPr id="1" name=""/>
+        <p:cNvGrpSpPr/>
+        <p:nvPr/>
+      </p:nvGrpSpPr>
+      <p:grpSpPr>
+        <a:xfrm>
+          <a:off x="0" y="0"/>
+          <a:ext cx="0" cy="0"/>
+          <a:chOff x="0" y="0"/>
+          <a:chExt cx="0" cy="0"/>
+        </a:xfrm>
+      </p:grpSpPr>
+      <p:sp>
+        <p:nvSpPr>
+          <p:cNvPr id="2" name="Header Placeholder 1">
+            <a:extLst>
+              <a:ext uri="{FF2B5EF4-FFF2-40B4-BE49-F238E27FC236}">
+                <a16:creationId xmlns:a16="http://schemas.microsoft.com/office/drawing/2014/main" id="{6D8F9802-0F16-4942-AC2C-C98D9A844C07}"/>
+              </a:ext>
+            </a:extLst>
+          </p:cNvPr>
+          <p:cNvSpPr>
+            <a:spLocks noGrp="1"/>
+          </p:cNvSpPr>
+          <p:nvPr>
+            <p:ph type="hdr" sz="quarter"/>
+          </p:nvPr>
+        </p:nvSpPr>
+        <p:spPr>
+          <a:xfrm>
+            <a:off x="0" y="0"/>
+            <a:ext cx="2971800" cy="458788"/>
+          </a:xfrm>
+          <a:prstGeom prst="rect">
+            <a:avLst/>
+          </a:prstGeom>
+        </p:spPr>
+        <p:txBody>
+          <a:bodyPr vert="horz" lIns="91440" tIns="45720" rIns="91440" bIns="45720" rtlCol="0"/>
+          <a:lstStyle>
+            <a:lvl1pPr algn="l">
+              <a:defRPr sz="1200"/>
+            </a:lvl1pPr>
+          </a:lstStyle>
+          <a:p>
+            <a:endParaRPr lang="en-US"/>
+          </a:p>
+        </p:txBody>
+      </p:sp>
+      <p:sp>
+        <p:nvSpPr>
+          <p:cNvPr id="3" name="Date Placeholder 2">
+            <a:extLst>
+              <a:ext uri="{FF2B5EF4-FFF2-40B4-BE49-F238E27FC236}">
+                <a16:creationId xmlns:a16="http://schemas.microsoft.com/office/drawing/2014/main" id="{181EEC8D-F663-417E-8350-6B7926894D66}"/>
+              </a:ext>
+            </a:extLst>
+          </p:cNvPr>
+          <p:cNvSpPr>
+            <a:spLocks noGrp="1"/>
+          </p:cNvSpPr>
+          <p:nvPr>
+            <p:ph type="dt" sz="quarter" idx="1"/>
+          </p:nvPr>
+        </p:nvSpPr>
+        <p:spPr>
+          <a:xfrm>
+            <a:off x="3884613" y="0"/>
+            <a:ext cx="2971800" cy="458788"/>
+          </a:xfrm>
+          <a:prstGeom prst="rect">
+            <a:avLst/>
+          </a:prstGeom>
+        </p:spPr>
+        <p:txBody>
+          <a:bodyPr vert="horz" lIns="91440" tIns="45720" rIns="91440" bIns="45720" rtlCol="0"/>
+          <a:lstStyle>
+            <a:lvl1pPr algn="r">
+              <a:defRPr sz="1200"/>
+            </a:lvl1pPr>
+          </a:lstStyle>
+          <a:p>
+            <a:fld id="{885E8F64-0C78-4255-8B40-B580DC519733}" type="datetimeFigureOut">
+              <a:rPr lang="en-US" smtClean="0"/>
+              <a:t>11/28/2018</a:t>
+            </a:fld>
+            <a:endParaRPr lang="en-US"/>
+          </a:p>
+        </p:txBody>
+      </p:sp>
+      <p:sp>
+        <p:nvSpPr>
+          <p:cNvPr id="4" name="Footer Placeholder 3">
+            <a:extLst>
+              <a:ext uri="{FF2B5EF4-FFF2-40B4-BE49-F238E27FC236}">
+                <a16:creationId xmlns:a16="http://schemas.microsoft.com/office/drawing/2014/main" id="{457F880A-34BE-469F-BBF3-6646AA033180}"/>
+              </a:ext>
+            </a:extLst>
+          </p:cNvPr>
+          <p:cNvSpPr>
+            <a:spLocks noGrp="1"/>
+          </p:cNvSpPr>
+          <p:nvPr>
+            <p:ph type="ftr" sz="quarter" idx="2"/>
+          </p:nvPr>
+        </p:nvSpPr>
+        <p:spPr>
+          <a:xfrm>
+            <a:off x="0" y="8685213"/>
+            <a:ext cx="2971800" cy="458787"/>
+          </a:xfrm>
+          <a:prstGeom prst="rect">
+            <a:avLst/>
+          </a:prstGeom>
+        </p:spPr>
+        <p:txBody>
+          <a:bodyPr vert="horz" lIns="91440" tIns="45720" rIns="91440" bIns="45720" rtlCol="0" anchor="b"/>
+          <a:lstStyle>
+            <a:lvl1pPr algn="l">
+              <a:defRPr sz="1200"/>
+            </a:lvl1pPr>
+          </a:lstStyle>
+          <a:p>
+            <a:endParaRPr lang="en-US"/>
+          </a:p>
+        </p:txBody>
+      </p:sp>
+      <p:sp>
+        <p:nvSpPr>
+          <p:cNvPr id="5" name="Slide Number Placeholder 4">
+            <a:extLst>
+              <a:ext uri="{FF2B5EF4-FFF2-40B4-BE49-F238E27FC236}">
+                <a16:creationId xmlns:a16="http://schemas.microsoft.com/office/drawing/2014/main" id="{DE1BAF73-EAA4-4CF7-8460-E4D2AEB84976}"/>
+              </a:ext>
+            </a:extLst>
+          </p:cNvPr>
+          <p:cNvSpPr>
+            <a:spLocks noGrp="1"/>
+          </p:cNvSpPr>
+          <p:nvPr>
+            <p:ph type="sldNum" sz="quarter" idx="3"/>
+          </p:nvPr>
+        </p:nvSpPr>
+        <p:spPr>
+          <a:xfrm>
+            <a:off x="3884613" y="8685213"/>
+            <a:ext cx="2971800" cy="458787"/>
+          </a:xfrm>
+          <a:prstGeom prst="rect">
+            <a:avLst/>
+          </a:prstGeom>
+        </p:spPr>
+        <p:txBody>
+          <a:bodyPr vert="horz" lIns="91440" tIns="45720" rIns="91440" bIns="45720" rtlCol="0" anchor="b"/>
+          <a:lstStyle>
+            <a:lvl1pPr algn="r">
+              <a:defRPr sz="1200"/>
+            </a:lvl1pPr>
+          </a:lstStyle>
+          <a:p>
+            <a:fld id="{9BA5071B-398B-4C18-BC1F-F2BCD9D6169E}" type="slidenum">
+              <a:rPr lang="en-US" smtClean="0"/>
+              <a:t>‹#›</a:t>
+            </a:fld>
+            <a:endParaRPr lang="en-US"/>
+          </a:p>
+        </p:txBody>
+      </p:sp>
+    </p:spTree>
+    <p:extLst>
+      <p:ext uri="{BB962C8B-B14F-4D97-AF65-F5344CB8AC3E}">
+        <p14:creationId xmlns:p14="http://schemas.microsoft.com/office/powerpoint/2010/main" val="1447690380"/>
+      </p:ext>
+    </p:extLst>
+  </p:cSld>
+  <p:clrMap bg1="lt1" tx1="dk1" bg2="lt2" tx2="dk2" accent1="accent1" accent2="accent2" accent3="accent3" accent4="accent4" accent5="accent5" accent6="accent6" hlink="hlink" folHlink="folHlink"/>
+</p:handoutMaster>
 </file>
 
 <file path=ppt/notesMasters/notesMaster1.xml><?xml version="1.0" encoding="utf-8"?>
@@ -648,54 +845,7 @@
               <a:buFontTx/>
               <a:buChar char="-"/>
             </a:pPr>
-            <a:r>
-              <a:rPr lang="en-US" dirty="0"/>
-              <a:t>FBI catches Puerto Rico widespread modification of smart meters</a:t>
-            </a:r>
-          </a:p>
-          <a:p>
-            <a:pPr marL="171450" indent="-171450">
-              <a:buFontTx/>
-              <a:buChar char="-"/>
-            </a:pPr>
-            <a:r>
-              <a:rPr lang="en-US" dirty="0"/>
-              <a:t>Will cost up to 400 million dollar damages</a:t>
-            </a:r>
-          </a:p>
-          <a:p>
-            <a:pPr marL="171450" indent="-171450">
-              <a:buFontTx/>
-              <a:buChar char="-"/>
-            </a:pPr>
-            <a:r>
-              <a:rPr lang="en-US" dirty="0" err="1"/>
-              <a:t>Youtube</a:t>
-            </a:r>
-            <a:r>
-              <a:rPr lang="en-US" dirty="0"/>
-              <a:t> video on right is how to hack one </a:t>
-            </a:r>
-          </a:p>
-          <a:p>
-            <a:pPr marL="628650" lvl="1" indent="-171450">
-              <a:buFontTx/>
-              <a:buChar char="-"/>
-            </a:pPr>
-            <a:r>
-              <a:rPr lang="en-US" dirty="0"/>
-              <a:t>blue-white wire reports back to company, can disconnect to keep price stable</a:t>
-            </a:r>
-          </a:p>
-          <a:p>
-            <a:pPr marL="628650" lvl="1" indent="-171450">
-              <a:buFontTx/>
-              <a:buChar char="-"/>
-            </a:pPr>
-            <a:r>
-              <a:rPr lang="en-US" dirty="0"/>
-              <a:t>Switches decide whether to access line</a:t>
-            </a:r>
+            <a:endParaRPr lang="en-US" dirty="0"/>
           </a:p>
         </p:txBody>
       </p:sp>
@@ -779,10 +929,61 @@
           <a:bodyPr/>
           <a:lstStyle/>
           <a:p>
+            <a:pPr marL="171450" indent="-171450">
+              <a:buFontTx/>
+              <a:buChar char="-"/>
+            </a:pPr>
             <a:r>
               <a:rPr lang="en-US" dirty="0"/>
-              <a:t>- IEC 62056: Guidelines for smart metering standardization</a:t>
-            </a:r>
+              <a:t>FBI catches Puerto Rico widespread modification of smart meters</a:t>
+            </a:r>
+          </a:p>
+          <a:p>
+            <a:pPr marL="171450" indent="-171450">
+              <a:buFontTx/>
+              <a:buChar char="-"/>
+            </a:pPr>
+            <a:r>
+              <a:rPr lang="en-US" dirty="0"/>
+              <a:t>Will cost up to 400 million dollar damages</a:t>
+            </a:r>
+          </a:p>
+          <a:p>
+            <a:pPr marL="171450" indent="-171450">
+              <a:buFontTx/>
+              <a:buChar char="-"/>
+            </a:pPr>
+            <a:r>
+              <a:rPr lang="en-US" dirty="0" err="1"/>
+              <a:t>Youtube</a:t>
+            </a:r>
+            <a:r>
+              <a:rPr lang="en-US" dirty="0"/>
+              <a:t> video on right is how to hack one </a:t>
+            </a:r>
+          </a:p>
+          <a:p>
+            <a:pPr marL="628650" lvl="1" indent="-171450">
+              <a:buFontTx/>
+              <a:buChar char="-"/>
+            </a:pPr>
+            <a:r>
+              <a:rPr lang="en-US" dirty="0"/>
+              <a:t>blue-white wire reports back to company, can disconnect to keep price stable</a:t>
+            </a:r>
+          </a:p>
+          <a:p>
+            <a:pPr marL="628650" lvl="1" indent="-171450">
+              <a:buFontTx/>
+              <a:buChar char="-"/>
+            </a:pPr>
+            <a:r>
+              <a:rPr lang="en-US" dirty="0"/>
+              <a:t>Switches decide whether to access line</a:t>
+            </a:r>
+          </a:p>
+          <a:p>
+            <a:endParaRPr lang="en-US" dirty="0"/>
           </a:p>
         </p:txBody>
       </p:sp>
@@ -812,7 +1013,299 @@
     </p:spTree>
     <p:extLst>
       <p:ext uri="{BB962C8B-B14F-4D97-AF65-F5344CB8AC3E}">
+        <p14:creationId xmlns:p14="http://schemas.microsoft.com/office/powerpoint/2010/main" val="3084905778"/>
+      </p:ext>
+    </p:extLst>
+  </p:cSld>
+  <p:clrMapOvr>
+    <a:masterClrMapping/>
+  </p:clrMapOvr>
+</p:notes>
+</file>
+
+<file path=ppt/notesSlides/notesSlide4.xml><?xml version="1.0" encoding="utf-8"?>
+<p:notes xmlns:a="http://schemas.openxmlformats.org/drawingml/2006/main" xmlns:r="http://schemas.openxmlformats.org/officeDocument/2006/relationships" xmlns:p="http://schemas.openxmlformats.org/presentationml/2006/main">
+  <p:cSld>
+    <p:spTree>
+      <p:nvGrpSpPr>
+        <p:cNvPr id="1" name=""/>
+        <p:cNvGrpSpPr/>
+        <p:nvPr/>
+      </p:nvGrpSpPr>
+      <p:grpSpPr>
+        <a:xfrm>
+          <a:off x="0" y="0"/>
+          <a:ext cx="0" cy="0"/>
+          <a:chOff x="0" y="0"/>
+          <a:chExt cx="0" cy="0"/>
+        </a:xfrm>
+      </p:grpSpPr>
+      <p:sp>
+        <p:nvSpPr>
+          <p:cNvPr id="2" name="Slide Image Placeholder 1"/>
+          <p:cNvSpPr>
+            <a:spLocks noGrp="1" noRot="1" noChangeAspect="1"/>
+          </p:cNvSpPr>
+          <p:nvPr>
+            <p:ph type="sldImg"/>
+          </p:nvPr>
+        </p:nvSpPr>
+        <p:spPr/>
+      </p:sp>
+      <p:sp>
+        <p:nvSpPr>
+          <p:cNvPr id="3" name="Notes Placeholder 2"/>
+          <p:cNvSpPr>
+            <a:spLocks noGrp="1"/>
+          </p:cNvSpPr>
+          <p:nvPr>
+            <p:ph type="body" idx="1"/>
+          </p:nvPr>
+        </p:nvSpPr>
+        <p:spPr/>
+        <p:txBody>
+          <a:bodyPr/>
+          <a:lstStyle/>
+          <a:p>
+            <a:r>
+              <a:rPr lang="en-US" dirty="0"/>
+              <a:t>- IEC 62056: Guidelines for smart metering standardization</a:t>
+            </a:r>
+          </a:p>
+        </p:txBody>
+      </p:sp>
+      <p:sp>
+        <p:nvSpPr>
+          <p:cNvPr id="4" name="Slide Number Placeholder 3"/>
+          <p:cNvSpPr>
+            <a:spLocks noGrp="1"/>
+          </p:cNvSpPr>
+          <p:nvPr>
+            <p:ph type="sldNum" sz="quarter" idx="5"/>
+          </p:nvPr>
+        </p:nvSpPr>
+        <p:spPr/>
+        <p:txBody>
+          <a:bodyPr/>
+          <a:lstStyle/>
+          <a:p>
+            <a:fld id="{2C4C5C6A-5C69-4A81-8979-AFB55B1F027A}" type="slidenum">
+              <a:rPr lang="en-US" smtClean="0"/>
+              <a:t>7</a:t>
+            </a:fld>
+            <a:endParaRPr lang="en-US"/>
+          </a:p>
+        </p:txBody>
+      </p:sp>
+    </p:spTree>
+    <p:extLst>
+      <p:ext uri="{BB962C8B-B14F-4D97-AF65-F5344CB8AC3E}">
         <p14:creationId xmlns:p14="http://schemas.microsoft.com/office/powerpoint/2010/main" val="3027066461"/>
+      </p:ext>
+    </p:extLst>
+  </p:cSld>
+  <p:clrMapOvr>
+    <a:masterClrMapping/>
+  </p:clrMapOvr>
+</p:notes>
+</file>
+
+<file path=ppt/notesSlides/notesSlide5.xml><?xml version="1.0" encoding="utf-8"?>
+<p:notes xmlns:a="http://schemas.openxmlformats.org/drawingml/2006/main" xmlns:r="http://schemas.openxmlformats.org/officeDocument/2006/relationships" xmlns:p="http://schemas.openxmlformats.org/presentationml/2006/main">
+  <p:cSld>
+    <p:spTree>
+      <p:nvGrpSpPr>
+        <p:cNvPr id="1" name=""/>
+        <p:cNvGrpSpPr/>
+        <p:nvPr/>
+      </p:nvGrpSpPr>
+      <p:grpSpPr>
+        <a:xfrm>
+          <a:off x="0" y="0"/>
+          <a:ext cx="0" cy="0"/>
+          <a:chOff x="0" y="0"/>
+          <a:chExt cx="0" cy="0"/>
+        </a:xfrm>
+      </p:grpSpPr>
+      <p:sp>
+        <p:nvSpPr>
+          <p:cNvPr id="2" name="Slide Image Placeholder 1"/>
+          <p:cNvSpPr>
+            <a:spLocks noGrp="1" noRot="1" noChangeAspect="1"/>
+          </p:cNvSpPr>
+          <p:nvPr>
+            <p:ph type="sldImg"/>
+          </p:nvPr>
+        </p:nvSpPr>
+        <p:spPr/>
+      </p:sp>
+      <p:sp>
+        <p:nvSpPr>
+          <p:cNvPr id="3" name="Notes Placeholder 2"/>
+          <p:cNvSpPr>
+            <a:spLocks noGrp="1"/>
+          </p:cNvSpPr>
+          <p:nvPr>
+            <p:ph type="body" idx="1"/>
+          </p:nvPr>
+        </p:nvSpPr>
+        <p:spPr/>
+        <p:txBody>
+          <a:bodyPr/>
+          <a:lstStyle/>
+          <a:p>
+            <a:pPr marL="171450" indent="-171450">
+              <a:buFontTx/>
+              <a:buChar char="-"/>
+            </a:pPr>
+            <a:r>
+              <a:rPr lang="en-US" dirty="0"/>
+              <a:t>IEC 61850 determines single substation requirements for message type and performance</a:t>
+            </a:r>
+          </a:p>
+          <a:p>
+            <a:pPr marL="171450" marR="0" lvl="0" indent="-171450" algn="l" defTabSz="914400" rtl="0" eaLnBrk="1" fontAlgn="auto" latinLnBrk="0" hangingPunct="1">
+              <a:lnSpc>
+                <a:spcPct val="100000"/>
+              </a:lnSpc>
+              <a:spcBef>
+                <a:spcPts val="0"/>
+              </a:spcBef>
+              <a:spcAft>
+                <a:spcPts val="0"/>
+              </a:spcAft>
+              <a:buClrTx/>
+              <a:buSzTx/>
+              <a:buFontTx/>
+              <a:buChar char="-"/>
+              <a:tabLst/>
+              <a:defRPr/>
+            </a:pPr>
+            <a:r>
+              <a:rPr lang="en-US" dirty="0"/>
+              <a:t>Popular method of identifying generation circuits, similar to internet relays </a:t>
+            </a:r>
+            <a:r>
+              <a:rPr lang="en-US" b="1" dirty="0"/>
+              <a:t>Room 641A</a:t>
+            </a:r>
+          </a:p>
+        </p:txBody>
+      </p:sp>
+      <p:sp>
+        <p:nvSpPr>
+          <p:cNvPr id="4" name="Slide Number Placeholder 3"/>
+          <p:cNvSpPr>
+            <a:spLocks noGrp="1"/>
+          </p:cNvSpPr>
+          <p:nvPr>
+            <p:ph type="sldNum" sz="quarter" idx="5"/>
+          </p:nvPr>
+        </p:nvSpPr>
+        <p:spPr/>
+        <p:txBody>
+          <a:bodyPr/>
+          <a:lstStyle/>
+          <a:p>
+            <a:fld id="{2C4C5C6A-5C69-4A81-8979-AFB55B1F027A}" type="slidenum">
+              <a:rPr lang="en-US" smtClean="0"/>
+              <a:t>8</a:t>
+            </a:fld>
+            <a:endParaRPr lang="en-US"/>
+          </a:p>
+        </p:txBody>
+      </p:sp>
+    </p:spTree>
+    <p:extLst>
+      <p:ext uri="{BB962C8B-B14F-4D97-AF65-F5344CB8AC3E}">
+        <p14:creationId xmlns:p14="http://schemas.microsoft.com/office/powerpoint/2010/main" val="3072502967"/>
+      </p:ext>
+    </p:extLst>
+  </p:cSld>
+  <p:clrMapOvr>
+    <a:masterClrMapping/>
+  </p:clrMapOvr>
+</p:notes>
+</file>
+
+<file path=ppt/notesSlides/notesSlide6.xml><?xml version="1.0" encoding="utf-8"?>
+<p:notes xmlns:a="http://schemas.openxmlformats.org/drawingml/2006/main" xmlns:r="http://schemas.openxmlformats.org/officeDocument/2006/relationships" xmlns:p="http://schemas.openxmlformats.org/presentationml/2006/main">
+  <p:cSld>
+    <p:spTree>
+      <p:nvGrpSpPr>
+        <p:cNvPr id="1" name=""/>
+        <p:cNvGrpSpPr/>
+        <p:nvPr/>
+      </p:nvGrpSpPr>
+      <p:grpSpPr>
+        <a:xfrm>
+          <a:off x="0" y="0"/>
+          <a:ext cx="0" cy="0"/>
+          <a:chOff x="0" y="0"/>
+          <a:chExt cx="0" cy="0"/>
+        </a:xfrm>
+      </p:grpSpPr>
+      <p:sp>
+        <p:nvSpPr>
+          <p:cNvPr id="2" name="Slide Image Placeholder 1"/>
+          <p:cNvSpPr>
+            <a:spLocks noGrp="1" noRot="1" noChangeAspect="1"/>
+          </p:cNvSpPr>
+          <p:nvPr>
+            <p:ph type="sldImg"/>
+          </p:nvPr>
+        </p:nvSpPr>
+        <p:spPr/>
+      </p:sp>
+      <p:sp>
+        <p:nvSpPr>
+          <p:cNvPr id="3" name="Notes Placeholder 2"/>
+          <p:cNvSpPr>
+            <a:spLocks noGrp="1"/>
+          </p:cNvSpPr>
+          <p:nvPr>
+            <p:ph type="body" idx="1"/>
+          </p:nvPr>
+        </p:nvSpPr>
+        <p:spPr/>
+        <p:txBody>
+          <a:bodyPr/>
+          <a:lstStyle/>
+          <a:p>
+            <a:r>
+              <a:rPr lang="en-US" dirty="0"/>
+              <a:t>- For full implementation will attempt to simulate a substation using available tools, however online tools are picky.</a:t>
+            </a:r>
+          </a:p>
+        </p:txBody>
+      </p:sp>
+      <p:sp>
+        <p:nvSpPr>
+          <p:cNvPr id="4" name="Slide Number Placeholder 3"/>
+          <p:cNvSpPr>
+            <a:spLocks noGrp="1"/>
+          </p:cNvSpPr>
+          <p:nvPr>
+            <p:ph type="sldNum" sz="quarter" idx="5"/>
+          </p:nvPr>
+        </p:nvSpPr>
+        <p:spPr/>
+        <p:txBody>
+          <a:bodyPr/>
+          <a:lstStyle/>
+          <a:p>
+            <a:fld id="{2C4C5C6A-5C69-4A81-8979-AFB55B1F027A}" type="slidenum">
+              <a:rPr lang="en-US" smtClean="0"/>
+              <a:t>11</a:t>
+            </a:fld>
+            <a:endParaRPr lang="en-US"/>
+          </a:p>
+        </p:txBody>
+      </p:sp>
+    </p:spTree>
+    <p:extLst>
+      <p:ext uri="{BB962C8B-B14F-4D97-AF65-F5344CB8AC3E}">
+        <p14:creationId xmlns:p14="http://schemas.microsoft.com/office/powerpoint/2010/main" val="1049195254"/>
       </p:ext>
     </p:extLst>
   </p:cSld>
@@ -1481,7 +1974,12 @@
             <p:ph type="title"/>
           </p:nvPr>
         </p:nvSpPr>
-        <p:spPr/>
+        <p:spPr>
+          <a:xfrm>
+            <a:off x="838200" y="136525"/>
+            <a:ext cx="10515600" cy="1325563"/>
+          </a:xfrm>
+        </p:spPr>
         <p:txBody>
           <a:bodyPr/>
           <a:lstStyle/>
@@ -1954,7 +2452,12 @@
             <p:ph type="title"/>
           </p:nvPr>
         </p:nvSpPr>
-        <p:spPr/>
+        <p:spPr>
+          <a:xfrm>
+            <a:off x="838200" y="136525"/>
+            <a:ext cx="10515600" cy="1325563"/>
+          </a:xfrm>
+        </p:spPr>
         <p:txBody>
           <a:bodyPr/>
           <a:lstStyle/>
@@ -2221,7 +2724,7 @@
         </p:nvSpPr>
         <p:spPr>
           <a:xfrm>
-            <a:off x="839788" y="365125"/>
+            <a:off x="838200" y="184761"/>
             <a:ext cx="10515600" cy="1325563"/>
           </a:xfrm>
         </p:spPr>
@@ -4416,6 +4919,14 @@
 <file path=ppt/slides/slide10.xml><?xml version="1.0" encoding="utf-8"?>
 <p:sld xmlns:a="http://schemas.openxmlformats.org/drawingml/2006/main" xmlns:r="http://schemas.openxmlformats.org/officeDocument/2006/relationships" xmlns:p="http://schemas.openxmlformats.org/presentationml/2006/main">
   <p:cSld>
+    <p:bg>
+      <p:bgPr>
+        <a:solidFill>
+          <a:schemeClr val="bg1"/>
+        </a:solidFill>
+        <a:effectLst/>
+      </p:bgPr>
+    </p:bg>
     <p:spTree>
       <p:nvGrpSpPr>
         <p:cNvPr id="1" name=""/>
@@ -4432,10 +4943,73 @@
       </p:grpSpPr>
       <p:sp>
         <p:nvSpPr>
+          <p:cNvPr id="10" name="Rectangle 9">
+            <a:extLst>
+              <a:ext uri="{FF2B5EF4-FFF2-40B4-BE49-F238E27FC236}">
+                <a16:creationId xmlns:a16="http://schemas.microsoft.com/office/drawing/2014/main" id="{A4AC5506-6312-4701-8D3C-40187889A947}"/>
+              </a:ext>
+              <a:ext uri="{C183D7F6-B498-43B3-948B-1728B52AA6E4}">
+                <adec:decorative xmlns:adec="http://schemas.microsoft.com/office/drawing/2017/decorative" val="1"/>
+              </a:ext>
+            </a:extLst>
+          </p:cNvPr>
+          <p:cNvSpPr>
+            <a:spLocks noGrp="1" noRot="1" noChangeAspect="1" noMove="1" noResize="1" noEditPoints="1" noAdjustHandles="1" noChangeArrowheads="1" noChangeShapeType="1" noTextEdit="1"/>
+          </p:cNvSpPr>
+          <p:nvPr>
+            <p:extLst>
+              <p:ext uri="{386F3935-93C4-4BCD-93E2-E3B085C9AB24}">
+                <p16:designElem xmlns:p16="http://schemas.microsoft.com/office/powerpoint/2015/main" val="1"/>
+              </p:ext>
+            </p:extLst>
+          </p:nvPr>
+        </p:nvSpPr>
+        <p:spPr>
+          <a:xfrm>
+            <a:off x="0" y="651752"/>
+            <a:ext cx="12192000" cy="736551"/>
+          </a:xfrm>
+          <a:prstGeom prst="rect">
+            <a:avLst/>
+          </a:prstGeom>
+          <a:solidFill>
+            <a:schemeClr val="tx1"/>
+          </a:solidFill>
+          <a:ln>
+            <a:noFill/>
+          </a:ln>
+        </p:spPr>
+        <p:style>
+          <a:lnRef idx="2">
+            <a:schemeClr val="accent1">
+              <a:shade val="50000"/>
+            </a:schemeClr>
+          </a:lnRef>
+          <a:fillRef idx="1">
+            <a:schemeClr val="accent1"/>
+          </a:fillRef>
+          <a:effectRef idx="0">
+            <a:schemeClr val="accent1"/>
+          </a:effectRef>
+          <a:fontRef idx="minor">
+            <a:schemeClr val="lt1"/>
+          </a:fontRef>
+        </p:style>
+        <p:txBody>
+          <a:bodyPr rtlCol="0" anchor="ctr"/>
+          <a:lstStyle/>
+          <a:p>
+            <a:pPr algn="ctr"/>
+            <a:endParaRPr lang="en-US"/>
+          </a:p>
+        </p:txBody>
+      </p:sp>
+      <p:sp>
+        <p:nvSpPr>
           <p:cNvPr id="2" name="Title 1">
             <a:extLst>
               <a:ext uri="{FF2B5EF4-FFF2-40B4-BE49-F238E27FC236}">
-                <a16:creationId xmlns:a16="http://schemas.microsoft.com/office/drawing/2014/main" id="{6E2FB4C0-8BE2-418A-ABD5-BA11ECC32E1A}"/>
+                <a16:creationId xmlns:a16="http://schemas.microsoft.com/office/drawing/2014/main" id="{9F5D4530-152A-40C0-BBD4-7E978C13B749}"/>
               </a:ext>
             </a:extLst>
           </p:cNvPr>
@@ -4446,44 +5020,74 @@
             <p:ph type="title"/>
           </p:nvPr>
         </p:nvSpPr>
-        <p:spPr/>
-        <p:txBody>
-          <a:bodyPr/>
-          <a:lstStyle/>
-          <a:p>
-            <a:endParaRPr lang="en-US"/>
-          </a:p>
-        </p:txBody>
-      </p:sp>
-      <p:sp>
-        <p:nvSpPr>
-          <p:cNvPr id="3" name="Content Placeholder 2">
-            <a:extLst>
-              <a:ext uri="{FF2B5EF4-FFF2-40B4-BE49-F238E27FC236}">
-                <a16:creationId xmlns:a16="http://schemas.microsoft.com/office/drawing/2014/main" id="{793102C6-B68E-4AD5-9D5D-80D00D918656}"/>
-              </a:ext>
-            </a:extLst>
-          </p:cNvPr>
-          <p:cNvSpPr>
-            <a:spLocks noGrp="1"/>
-          </p:cNvSpPr>
-          <p:nvPr>
-            <p:ph idx="1"/>
-          </p:nvPr>
-        </p:nvSpPr>
-        <p:spPr/>
-        <p:txBody>
-          <a:bodyPr/>
-          <a:lstStyle/>
-          <a:p>
-            <a:endParaRPr lang="en-US"/>
-          </a:p>
-        </p:txBody>
-      </p:sp>
+        <p:spPr>
+          <a:xfrm>
+            <a:off x="556532" y="643467"/>
+            <a:ext cx="11210925" cy="744836"/>
+          </a:xfrm>
+        </p:spPr>
+        <p:txBody>
+          <a:bodyPr vert="horz" lIns="91440" tIns="45720" rIns="91440" bIns="45720" rtlCol="0" anchor="ctr">
+            <a:normAutofit/>
+          </a:bodyPr>
+          <a:lstStyle/>
+          <a:p>
+            <a:pPr algn="ctr"/>
+            <a:r>
+              <a:rPr lang="en-US" sz="3200" kern="1200">
+                <a:solidFill>
+                  <a:schemeClr val="bg1"/>
+                </a:solidFill>
+                <a:latin typeface="+mj-lt"/>
+                <a:ea typeface="+mj-ea"/>
+                <a:cs typeface="+mj-cs"/>
+              </a:rPr>
+              <a:t>HMI examples</a:t>
+            </a:r>
+          </a:p>
+        </p:txBody>
+      </p:sp>
+      <p:pic>
+        <p:nvPicPr>
+          <p:cNvPr id="5" name="Picture 4" descr="A screenshot of a computer&#10;&#10;Description generated with very high confidence">
+            <a:extLst>
+              <a:ext uri="{FF2B5EF4-FFF2-40B4-BE49-F238E27FC236}">
+                <a16:creationId xmlns:a16="http://schemas.microsoft.com/office/drawing/2014/main" id="{7B571089-5426-4443-B1B8-9BBCDC4BF42C}"/>
+              </a:ext>
+            </a:extLst>
+          </p:cNvPr>
+          <p:cNvPicPr>
+            <a:picLocks noChangeAspect="1"/>
+          </p:cNvPicPr>
+          <p:nvPr/>
+        </p:nvPicPr>
+        <p:blipFill>
+          <a:blip r:embed="rId2">
+            <a:extLst>
+              <a:ext uri="{28A0092B-C50C-407E-A947-70E740481C1C}">
+                <a14:useLocalDpi xmlns:a14="http://schemas.microsoft.com/office/drawing/2010/main" val="0"/>
+              </a:ext>
+            </a:extLst>
+          </a:blip>
+          <a:stretch>
+            <a:fillRect/>
+          </a:stretch>
+        </p:blipFill>
+        <p:spPr>
+          <a:xfrm>
+            <a:off x="643467" y="2686401"/>
+            <a:ext cx="10905066" cy="2371850"/>
+          </a:xfrm>
+          <a:prstGeom prst="rect">
+            <a:avLst/>
+          </a:prstGeom>
+          <a:noFill/>
+        </p:spPr>
+      </p:pic>
     </p:spTree>
     <p:extLst>
       <p:ext uri="{BB962C8B-B14F-4D97-AF65-F5344CB8AC3E}">
-        <p14:creationId xmlns:p14="http://schemas.microsoft.com/office/powerpoint/2010/main" val="917689768"/>
+        <p14:creationId xmlns:p14="http://schemas.microsoft.com/office/powerpoint/2010/main" val="703967711"/>
       </p:ext>
     </p:extLst>
   </p:cSld>
@@ -4515,7 +5119,7 @@
           <p:cNvPr id="2" name="Title 1">
             <a:extLst>
               <a:ext uri="{FF2B5EF4-FFF2-40B4-BE49-F238E27FC236}">
-                <a16:creationId xmlns:a16="http://schemas.microsoft.com/office/drawing/2014/main" id="{1D7D21F3-363E-4E3F-945F-23FBF0F6122D}"/>
+                <a16:creationId xmlns:a16="http://schemas.microsoft.com/office/drawing/2014/main" id="{36BC3588-21B1-4E0D-B369-CE96ABF26ACC}"/>
               </a:ext>
             </a:extLst>
           </p:cNvPr>
@@ -4531,7 +5135,10 @@
           <a:bodyPr/>
           <a:lstStyle/>
           <a:p>
-            <a:endParaRPr lang="en-US"/>
+            <a:r>
+              <a:rPr lang="en-US" dirty="0"/>
+              <a:t>Defense on HMI timing attack</a:t>
+            </a:r>
           </a:p>
         </p:txBody>
       </p:sp>
@@ -4540,7 +5147,7 @@
           <p:cNvPr id="3" name="Content Placeholder 2">
             <a:extLst>
               <a:ext uri="{FF2B5EF4-FFF2-40B4-BE49-F238E27FC236}">
-                <a16:creationId xmlns:a16="http://schemas.microsoft.com/office/drawing/2014/main" id="{0323E8C7-0DB2-40E5-BA48-91F358E166B3}"/>
+                <a16:creationId xmlns:a16="http://schemas.microsoft.com/office/drawing/2014/main" id="{9D2BA97B-47BB-4E26-9D73-A024EF177C32}"/>
               </a:ext>
             </a:extLst>
           </p:cNvPr>
@@ -4556,14 +5163,45 @@
           <a:bodyPr/>
           <a:lstStyle/>
           <a:p>
-            <a:endParaRPr lang="en-US"/>
+            <a:r>
+              <a:rPr lang="en-US" dirty="0"/>
+              <a:t>Deterministic browser</a:t>
+            </a:r>
+          </a:p>
+          <a:p>
+            <a:pPr lvl="1"/>
+            <a:r>
+              <a:rPr lang="en-US" dirty="0"/>
+              <a:t>Aims at making all operations within browser at constant time</a:t>
+            </a:r>
+          </a:p>
+          <a:p>
+            <a:pPr lvl="1"/>
+            <a:r>
+              <a:rPr lang="en-US" dirty="0"/>
+              <a:t>Across all browsers in the SCADA network, this time should be the same</a:t>
+            </a:r>
+          </a:p>
+          <a:p>
+            <a:endParaRPr lang="en-US" dirty="0"/>
+          </a:p>
+          <a:p>
+            <a:endParaRPr lang="en-US" dirty="0"/>
+          </a:p>
+          <a:p>
+            <a:pPr lvl="1"/>
+            <a:endParaRPr lang="en-US" dirty="0"/>
+          </a:p>
+          <a:p>
+            <a:pPr lvl="1"/>
+            <a:endParaRPr lang="en-US" dirty="0"/>
           </a:p>
         </p:txBody>
       </p:sp>
     </p:spTree>
     <p:extLst>
       <p:ext uri="{BB962C8B-B14F-4D97-AF65-F5344CB8AC3E}">
-        <p14:creationId xmlns:p14="http://schemas.microsoft.com/office/powerpoint/2010/main" val="1547272108"/>
+        <p14:creationId xmlns:p14="http://schemas.microsoft.com/office/powerpoint/2010/main" val="575843591"/>
       </p:ext>
     </p:extLst>
   </p:cSld>
@@ -4574,6 +5212,226 @@
 </file>
 
 <file path=ppt/slides/slide12.xml><?xml version="1.0" encoding="utf-8"?>
+<p:sld xmlns:a="http://schemas.openxmlformats.org/drawingml/2006/main" xmlns:r="http://schemas.openxmlformats.org/officeDocument/2006/relationships" xmlns:p="http://schemas.openxmlformats.org/presentationml/2006/main">
+  <p:cSld>
+    <p:bg>
+      <p:bgPr>
+        <a:solidFill>
+          <a:schemeClr val="bg1"/>
+        </a:solidFill>
+        <a:effectLst/>
+      </p:bgPr>
+    </p:bg>
+    <p:spTree>
+      <p:nvGrpSpPr>
+        <p:cNvPr id="1" name=""/>
+        <p:cNvGrpSpPr/>
+        <p:nvPr/>
+      </p:nvGrpSpPr>
+      <p:grpSpPr>
+        <a:xfrm>
+          <a:off x="0" y="0"/>
+          <a:ext cx="0" cy="0"/>
+          <a:chOff x="0" y="0"/>
+          <a:chExt cx="0" cy="0"/>
+        </a:xfrm>
+      </p:grpSpPr>
+      <p:sp>
+        <p:nvSpPr>
+          <p:cNvPr id="10" name="Rectangle 9">
+            <a:extLst>
+              <a:ext uri="{FF2B5EF4-FFF2-40B4-BE49-F238E27FC236}">
+                <a16:creationId xmlns:a16="http://schemas.microsoft.com/office/drawing/2014/main" id="{A4AC5506-6312-4701-8D3C-40187889A947}"/>
+              </a:ext>
+              <a:ext uri="{C183D7F6-B498-43B3-948B-1728B52AA6E4}">
+                <adec:decorative xmlns:adec="http://schemas.microsoft.com/office/drawing/2017/decorative" val="1"/>
+              </a:ext>
+            </a:extLst>
+          </p:cNvPr>
+          <p:cNvSpPr>
+            <a:spLocks noGrp="1" noRot="1" noChangeAspect="1" noMove="1" noResize="1" noEditPoints="1" noAdjustHandles="1" noChangeArrowheads="1" noChangeShapeType="1" noTextEdit="1"/>
+          </p:cNvSpPr>
+          <p:nvPr>
+            <p:extLst>
+              <p:ext uri="{386F3935-93C4-4BCD-93E2-E3B085C9AB24}">
+                <p16:designElem xmlns:p16="http://schemas.microsoft.com/office/powerpoint/2015/main" val="1"/>
+              </p:ext>
+            </p:extLst>
+          </p:nvPr>
+        </p:nvSpPr>
+        <p:spPr>
+          <a:xfrm>
+            <a:off x="0" y="651752"/>
+            <a:ext cx="12192000" cy="736551"/>
+          </a:xfrm>
+          <a:prstGeom prst="rect">
+            <a:avLst/>
+          </a:prstGeom>
+          <a:solidFill>
+            <a:schemeClr val="tx1"/>
+          </a:solidFill>
+          <a:ln>
+            <a:noFill/>
+          </a:ln>
+        </p:spPr>
+        <p:style>
+          <a:lnRef idx="2">
+            <a:schemeClr val="accent1">
+              <a:shade val="50000"/>
+            </a:schemeClr>
+          </a:lnRef>
+          <a:fillRef idx="1">
+            <a:schemeClr val="accent1"/>
+          </a:fillRef>
+          <a:effectRef idx="0">
+            <a:schemeClr val="accent1"/>
+          </a:effectRef>
+          <a:fontRef idx="minor">
+            <a:schemeClr val="lt1"/>
+          </a:fontRef>
+        </p:style>
+        <p:txBody>
+          <a:bodyPr rtlCol="0" anchor="ctr"/>
+          <a:lstStyle/>
+          <a:p>
+            <a:pPr algn="ctr"/>
+            <a:endParaRPr lang="en-US"/>
+          </a:p>
+        </p:txBody>
+      </p:sp>
+      <p:sp>
+        <p:nvSpPr>
+          <p:cNvPr id="2" name="Title 1">
+            <a:extLst>
+              <a:ext uri="{FF2B5EF4-FFF2-40B4-BE49-F238E27FC236}">
+                <a16:creationId xmlns:a16="http://schemas.microsoft.com/office/drawing/2014/main" id="{9F5D4530-152A-40C0-BBD4-7E978C13B749}"/>
+              </a:ext>
+            </a:extLst>
+          </p:cNvPr>
+          <p:cNvSpPr>
+            <a:spLocks noGrp="1"/>
+          </p:cNvSpPr>
+          <p:nvPr>
+            <p:ph type="title"/>
+          </p:nvPr>
+        </p:nvSpPr>
+        <p:spPr>
+          <a:xfrm>
+            <a:off x="556532" y="643467"/>
+            <a:ext cx="11210925" cy="744836"/>
+          </a:xfrm>
+        </p:spPr>
+        <p:txBody>
+          <a:bodyPr vert="horz" lIns="91440" tIns="45720" rIns="91440" bIns="45720" rtlCol="0" anchor="ctr">
+            <a:normAutofit/>
+          </a:bodyPr>
+          <a:lstStyle/>
+          <a:p>
+            <a:pPr algn="ctr"/>
+            <a:r>
+              <a:rPr lang="en-US" sz="3200" kern="1200">
+                <a:solidFill>
+                  <a:schemeClr val="bg1"/>
+                </a:solidFill>
+                <a:latin typeface="+mj-lt"/>
+                <a:ea typeface="+mj-ea"/>
+                <a:cs typeface="+mj-cs"/>
+              </a:rPr>
+              <a:t>HMI examples</a:t>
+            </a:r>
+          </a:p>
+        </p:txBody>
+      </p:sp>
+      <p:pic>
+        <p:nvPicPr>
+          <p:cNvPr id="6" name="Content Placeholder 4">
+            <a:extLst>
+              <a:ext uri="{FF2B5EF4-FFF2-40B4-BE49-F238E27FC236}">
+                <a16:creationId xmlns:a16="http://schemas.microsoft.com/office/drawing/2014/main" id="{6842353E-97EE-4F23-B752-08784C529622}"/>
+              </a:ext>
+            </a:extLst>
+          </p:cNvPr>
+          <p:cNvPicPr>
+            <a:picLocks noGrp="1" noChangeAspect="1"/>
+          </p:cNvPicPr>
+          <p:nvPr>
+            <p:ph sz="half" idx="1"/>
+          </p:nvPr>
+        </p:nvPicPr>
+        <p:blipFill rotWithShape="1">
+          <a:blip r:embed="rId2"/>
+          <a:srcRect l="6261" r="10389"/>
+          <a:stretch/>
+        </p:blipFill>
+        <p:spPr>
+          <a:xfrm>
+            <a:off x="177799" y="2150406"/>
+            <a:ext cx="5613613" cy="3518874"/>
+          </a:xfrm>
+          <a:prstGeom prst="rect">
+            <a:avLst/>
+          </a:prstGeom>
+          <a:ln w="12700">
+            <a:solidFill>
+              <a:schemeClr val="tx1"/>
+            </a:solidFill>
+          </a:ln>
+        </p:spPr>
+      </p:pic>
+      <p:pic>
+        <p:nvPicPr>
+          <p:cNvPr id="7" name="Content Placeholder 5" descr="A screenshot of a social media post&#10;&#10;Description automatically generated">
+            <a:extLst>
+              <a:ext uri="{FF2B5EF4-FFF2-40B4-BE49-F238E27FC236}">
+                <a16:creationId xmlns:a16="http://schemas.microsoft.com/office/drawing/2014/main" id="{73F4A7A4-8016-4DA6-9C67-1AEF3BFB32FB}"/>
+              </a:ext>
+            </a:extLst>
+          </p:cNvPr>
+          <p:cNvPicPr>
+            <a:picLocks noChangeAspect="1"/>
+          </p:cNvPicPr>
+          <p:nvPr/>
+        </p:nvPicPr>
+        <p:blipFill rotWithShape="1">
+          <a:blip r:embed="rId3">
+            <a:extLst>
+              <a:ext uri="{28A0092B-C50C-407E-A947-70E740481C1C}">
+                <a14:useLocalDpi xmlns:a14="http://schemas.microsoft.com/office/drawing/2010/main" val="0"/>
+              </a:ext>
+            </a:extLst>
+          </a:blip>
+          <a:srcRect l="5943" t="9628" r="925" b="4237"/>
+          <a:stretch/>
+        </p:blipFill>
+        <p:spPr>
+          <a:xfrm>
+            <a:off x="6096000" y="2150406"/>
+            <a:ext cx="5913120" cy="3518874"/>
+          </a:xfrm>
+          <a:prstGeom prst="rect">
+            <a:avLst/>
+          </a:prstGeom>
+          <a:ln w="12700">
+            <a:solidFill>
+              <a:schemeClr val="tx1"/>
+            </a:solidFill>
+          </a:ln>
+        </p:spPr>
+      </p:pic>
+    </p:spTree>
+    <p:extLst>
+      <p:ext uri="{BB962C8B-B14F-4D97-AF65-F5344CB8AC3E}">
+        <p14:creationId xmlns:p14="http://schemas.microsoft.com/office/powerpoint/2010/main" val="2620302540"/>
+      </p:ext>
+    </p:extLst>
+  </p:cSld>
+  <p:clrMapOvr>
+    <a:masterClrMapping/>
+  </p:clrMapOvr>
+</p:sld>
+</file>
+
+<file path=ppt/slides/slide13.xml><?xml version="1.0" encoding="utf-8"?>
 <p:sld xmlns:a="http://schemas.openxmlformats.org/drawingml/2006/main" xmlns:r="http://schemas.openxmlformats.org/officeDocument/2006/relationships" xmlns:p="http://schemas.openxmlformats.org/presentationml/2006/main">
   <p:cSld>
     <p:spTree>
@@ -4595,6 +5453,356 @@
           <p:cNvPr id="2" name="Title 1">
             <a:extLst>
               <a:ext uri="{FF2B5EF4-FFF2-40B4-BE49-F238E27FC236}">
+                <a16:creationId xmlns:a16="http://schemas.microsoft.com/office/drawing/2014/main" id="{7432AFA9-23ED-4864-A7C5-D740D6010AD8}"/>
+              </a:ext>
+            </a:extLst>
+          </p:cNvPr>
+          <p:cNvSpPr>
+            <a:spLocks noGrp="1"/>
+          </p:cNvSpPr>
+          <p:nvPr>
+            <p:ph type="title"/>
+          </p:nvPr>
+        </p:nvSpPr>
+        <p:spPr>
+          <a:xfrm>
+            <a:off x="838200" y="136525"/>
+            <a:ext cx="10515600" cy="1325563"/>
+          </a:xfrm>
+        </p:spPr>
+        <p:txBody>
+          <a:bodyPr/>
+          <a:lstStyle/>
+          <a:p>
+            <a:endParaRPr lang="en-US" dirty="0"/>
+          </a:p>
+        </p:txBody>
+      </p:sp>
+      <p:sp>
+        <p:nvSpPr>
+          <p:cNvPr id="7" name="Content Placeholder 6">
+            <a:extLst>
+              <a:ext uri="{FF2B5EF4-FFF2-40B4-BE49-F238E27FC236}">
+                <a16:creationId xmlns:a16="http://schemas.microsoft.com/office/drawing/2014/main" id="{2E5B3BB5-3DBE-4AA9-BA16-8816413FBC46}"/>
+              </a:ext>
+            </a:extLst>
+          </p:cNvPr>
+          <p:cNvSpPr>
+            <a:spLocks noGrp="1"/>
+          </p:cNvSpPr>
+          <p:nvPr>
+            <p:ph sz="half" idx="1"/>
+          </p:nvPr>
+        </p:nvSpPr>
+        <p:spPr/>
+        <p:txBody>
+          <a:bodyPr/>
+          <a:lstStyle/>
+          <a:p>
+            <a:endParaRPr lang="en-US"/>
+          </a:p>
+        </p:txBody>
+      </p:sp>
+      <p:sp>
+        <p:nvSpPr>
+          <p:cNvPr id="8" name="Content Placeholder 7">
+            <a:extLst>
+              <a:ext uri="{FF2B5EF4-FFF2-40B4-BE49-F238E27FC236}">
+                <a16:creationId xmlns:a16="http://schemas.microsoft.com/office/drawing/2014/main" id="{92B6BE43-51BD-4271-A4CD-2FDCEDE671CE}"/>
+              </a:ext>
+            </a:extLst>
+          </p:cNvPr>
+          <p:cNvSpPr>
+            <a:spLocks noGrp="1"/>
+          </p:cNvSpPr>
+          <p:nvPr>
+            <p:ph sz="half" idx="2"/>
+          </p:nvPr>
+        </p:nvSpPr>
+        <p:spPr/>
+        <p:txBody>
+          <a:bodyPr/>
+          <a:lstStyle/>
+          <a:p>
+            <a:endParaRPr lang="en-US"/>
+          </a:p>
+        </p:txBody>
+      </p:sp>
+    </p:spTree>
+    <p:extLst>
+      <p:ext uri="{BB962C8B-B14F-4D97-AF65-F5344CB8AC3E}">
+        <p14:creationId xmlns:p14="http://schemas.microsoft.com/office/powerpoint/2010/main" val="1223337143"/>
+      </p:ext>
+    </p:extLst>
+  </p:cSld>
+  <p:clrMapOvr>
+    <a:masterClrMapping/>
+  </p:clrMapOvr>
+</p:sld>
+</file>
+
+<file path=ppt/slides/slide14.xml><?xml version="1.0" encoding="utf-8"?>
+<p:sld xmlns:a="http://schemas.openxmlformats.org/drawingml/2006/main" xmlns:r="http://schemas.openxmlformats.org/officeDocument/2006/relationships" xmlns:p="http://schemas.openxmlformats.org/presentationml/2006/main">
+  <p:cSld>
+    <p:spTree>
+      <p:nvGrpSpPr>
+        <p:cNvPr id="1" name=""/>
+        <p:cNvGrpSpPr/>
+        <p:nvPr/>
+      </p:nvGrpSpPr>
+      <p:grpSpPr>
+        <a:xfrm>
+          <a:off x="0" y="0"/>
+          <a:ext cx="0" cy="0"/>
+          <a:chOff x="0" y="0"/>
+          <a:chExt cx="0" cy="0"/>
+        </a:xfrm>
+      </p:grpSpPr>
+      <p:sp>
+        <p:nvSpPr>
+          <p:cNvPr id="2" name="Title 1">
+            <a:extLst>
+              <a:ext uri="{FF2B5EF4-FFF2-40B4-BE49-F238E27FC236}">
+                <a16:creationId xmlns:a16="http://schemas.microsoft.com/office/drawing/2014/main" id="{D481189B-A70F-4E41-9EC2-3CF67205FCB4}"/>
+              </a:ext>
+            </a:extLst>
+          </p:cNvPr>
+          <p:cNvSpPr>
+            <a:spLocks noGrp="1"/>
+          </p:cNvSpPr>
+          <p:nvPr>
+            <p:ph type="title"/>
+          </p:nvPr>
+        </p:nvSpPr>
+        <p:spPr/>
+        <p:txBody>
+          <a:bodyPr/>
+          <a:lstStyle/>
+          <a:p>
+            <a:endParaRPr lang="en-US"/>
+          </a:p>
+        </p:txBody>
+      </p:sp>
+      <p:sp>
+        <p:nvSpPr>
+          <p:cNvPr id="3" name="Content Placeholder 2">
+            <a:extLst>
+              <a:ext uri="{FF2B5EF4-FFF2-40B4-BE49-F238E27FC236}">
+                <a16:creationId xmlns:a16="http://schemas.microsoft.com/office/drawing/2014/main" id="{20289608-DF40-462D-9D78-3E00BFBCF1DE}"/>
+              </a:ext>
+            </a:extLst>
+          </p:cNvPr>
+          <p:cNvSpPr>
+            <a:spLocks noGrp="1"/>
+          </p:cNvSpPr>
+          <p:nvPr>
+            <p:ph idx="1"/>
+          </p:nvPr>
+        </p:nvSpPr>
+        <p:spPr/>
+        <p:txBody>
+          <a:bodyPr/>
+          <a:lstStyle/>
+          <a:p>
+            <a:endParaRPr lang="en-US"/>
+          </a:p>
+        </p:txBody>
+      </p:sp>
+    </p:spTree>
+    <p:extLst>
+      <p:ext uri="{BB962C8B-B14F-4D97-AF65-F5344CB8AC3E}">
+        <p14:creationId xmlns:p14="http://schemas.microsoft.com/office/powerpoint/2010/main" val="3912311376"/>
+      </p:ext>
+    </p:extLst>
+  </p:cSld>
+  <p:clrMapOvr>
+    <a:masterClrMapping/>
+  </p:clrMapOvr>
+</p:sld>
+</file>
+
+<file path=ppt/slides/slide15.xml><?xml version="1.0" encoding="utf-8"?>
+<p:sld xmlns:a="http://schemas.openxmlformats.org/drawingml/2006/main" xmlns:r="http://schemas.openxmlformats.org/officeDocument/2006/relationships" xmlns:p="http://schemas.openxmlformats.org/presentationml/2006/main">
+  <p:cSld>
+    <p:spTree>
+      <p:nvGrpSpPr>
+        <p:cNvPr id="1" name=""/>
+        <p:cNvGrpSpPr/>
+        <p:nvPr/>
+      </p:nvGrpSpPr>
+      <p:grpSpPr>
+        <a:xfrm>
+          <a:off x="0" y="0"/>
+          <a:ext cx="0" cy="0"/>
+          <a:chOff x="0" y="0"/>
+          <a:chExt cx="0" cy="0"/>
+        </a:xfrm>
+      </p:grpSpPr>
+      <p:sp>
+        <p:nvSpPr>
+          <p:cNvPr id="2" name="Title 1">
+            <a:extLst>
+              <a:ext uri="{FF2B5EF4-FFF2-40B4-BE49-F238E27FC236}">
+                <a16:creationId xmlns:a16="http://schemas.microsoft.com/office/drawing/2014/main" id="{6E2FB4C0-8BE2-418A-ABD5-BA11ECC32E1A}"/>
+              </a:ext>
+            </a:extLst>
+          </p:cNvPr>
+          <p:cNvSpPr>
+            <a:spLocks noGrp="1"/>
+          </p:cNvSpPr>
+          <p:nvPr>
+            <p:ph type="title"/>
+          </p:nvPr>
+        </p:nvSpPr>
+        <p:spPr/>
+        <p:txBody>
+          <a:bodyPr/>
+          <a:lstStyle/>
+          <a:p>
+            <a:endParaRPr lang="en-US"/>
+          </a:p>
+        </p:txBody>
+      </p:sp>
+      <p:sp>
+        <p:nvSpPr>
+          <p:cNvPr id="3" name="Content Placeholder 2">
+            <a:extLst>
+              <a:ext uri="{FF2B5EF4-FFF2-40B4-BE49-F238E27FC236}">
+                <a16:creationId xmlns:a16="http://schemas.microsoft.com/office/drawing/2014/main" id="{793102C6-B68E-4AD5-9D5D-80D00D918656}"/>
+              </a:ext>
+            </a:extLst>
+          </p:cNvPr>
+          <p:cNvSpPr>
+            <a:spLocks noGrp="1"/>
+          </p:cNvSpPr>
+          <p:nvPr>
+            <p:ph idx="1"/>
+          </p:nvPr>
+        </p:nvSpPr>
+        <p:spPr/>
+        <p:txBody>
+          <a:bodyPr/>
+          <a:lstStyle/>
+          <a:p>
+            <a:endParaRPr lang="en-US"/>
+          </a:p>
+        </p:txBody>
+      </p:sp>
+    </p:spTree>
+    <p:extLst>
+      <p:ext uri="{BB962C8B-B14F-4D97-AF65-F5344CB8AC3E}">
+        <p14:creationId xmlns:p14="http://schemas.microsoft.com/office/powerpoint/2010/main" val="917689768"/>
+      </p:ext>
+    </p:extLst>
+  </p:cSld>
+  <p:clrMapOvr>
+    <a:masterClrMapping/>
+  </p:clrMapOvr>
+</p:sld>
+</file>
+
+<file path=ppt/slides/slide16.xml><?xml version="1.0" encoding="utf-8"?>
+<p:sld xmlns:a="http://schemas.openxmlformats.org/drawingml/2006/main" xmlns:r="http://schemas.openxmlformats.org/officeDocument/2006/relationships" xmlns:p="http://schemas.openxmlformats.org/presentationml/2006/main">
+  <p:cSld>
+    <p:spTree>
+      <p:nvGrpSpPr>
+        <p:cNvPr id="1" name=""/>
+        <p:cNvGrpSpPr/>
+        <p:nvPr/>
+      </p:nvGrpSpPr>
+      <p:grpSpPr>
+        <a:xfrm>
+          <a:off x="0" y="0"/>
+          <a:ext cx="0" cy="0"/>
+          <a:chOff x="0" y="0"/>
+          <a:chExt cx="0" cy="0"/>
+        </a:xfrm>
+      </p:grpSpPr>
+      <p:sp>
+        <p:nvSpPr>
+          <p:cNvPr id="2" name="Title 1">
+            <a:extLst>
+              <a:ext uri="{FF2B5EF4-FFF2-40B4-BE49-F238E27FC236}">
+                <a16:creationId xmlns:a16="http://schemas.microsoft.com/office/drawing/2014/main" id="{1D7D21F3-363E-4E3F-945F-23FBF0F6122D}"/>
+              </a:ext>
+            </a:extLst>
+          </p:cNvPr>
+          <p:cNvSpPr>
+            <a:spLocks noGrp="1"/>
+          </p:cNvSpPr>
+          <p:nvPr>
+            <p:ph type="title"/>
+          </p:nvPr>
+        </p:nvSpPr>
+        <p:spPr/>
+        <p:txBody>
+          <a:bodyPr/>
+          <a:lstStyle/>
+          <a:p>
+            <a:endParaRPr lang="en-US"/>
+          </a:p>
+        </p:txBody>
+      </p:sp>
+      <p:sp>
+        <p:nvSpPr>
+          <p:cNvPr id="3" name="Content Placeholder 2">
+            <a:extLst>
+              <a:ext uri="{FF2B5EF4-FFF2-40B4-BE49-F238E27FC236}">
+                <a16:creationId xmlns:a16="http://schemas.microsoft.com/office/drawing/2014/main" id="{0323E8C7-0DB2-40E5-BA48-91F358E166B3}"/>
+              </a:ext>
+            </a:extLst>
+          </p:cNvPr>
+          <p:cNvSpPr>
+            <a:spLocks noGrp="1"/>
+          </p:cNvSpPr>
+          <p:nvPr>
+            <p:ph idx="1"/>
+          </p:nvPr>
+        </p:nvSpPr>
+        <p:spPr/>
+        <p:txBody>
+          <a:bodyPr/>
+          <a:lstStyle/>
+          <a:p>
+            <a:endParaRPr lang="en-US"/>
+          </a:p>
+        </p:txBody>
+      </p:sp>
+    </p:spTree>
+    <p:extLst>
+      <p:ext uri="{BB962C8B-B14F-4D97-AF65-F5344CB8AC3E}">
+        <p14:creationId xmlns:p14="http://schemas.microsoft.com/office/powerpoint/2010/main" val="1547272108"/>
+      </p:ext>
+    </p:extLst>
+  </p:cSld>
+  <p:clrMapOvr>
+    <a:masterClrMapping/>
+  </p:clrMapOvr>
+</p:sld>
+</file>
+
+<file path=ppt/slides/slide17.xml><?xml version="1.0" encoding="utf-8"?>
+<p:sld xmlns:a="http://schemas.openxmlformats.org/drawingml/2006/main" xmlns:r="http://schemas.openxmlformats.org/officeDocument/2006/relationships" xmlns:p="http://schemas.openxmlformats.org/presentationml/2006/main">
+  <p:cSld>
+    <p:spTree>
+      <p:nvGrpSpPr>
+        <p:cNvPr id="1" name=""/>
+        <p:cNvGrpSpPr/>
+        <p:nvPr/>
+      </p:nvGrpSpPr>
+      <p:grpSpPr>
+        <a:xfrm>
+          <a:off x="0" y="0"/>
+          <a:ext cx="0" cy="0"/>
+          <a:chOff x="0" y="0"/>
+          <a:chExt cx="0" cy="0"/>
+        </a:xfrm>
+      </p:grpSpPr>
+      <p:sp>
+        <p:nvSpPr>
+          <p:cNvPr id="2" name="Title 1">
+            <a:extLst>
+              <a:ext uri="{FF2B5EF4-FFF2-40B4-BE49-F238E27FC236}">
                 <a16:creationId xmlns:a16="http://schemas.microsoft.com/office/drawing/2014/main" id="{65D290DC-8D72-4F04-990C-890C964798D6}"/>
               </a:ext>
             </a:extLst>
@@ -4639,6 +5847,37 @@
           <a:bodyPr/>
           <a:lstStyle/>
           <a:p>
+            <a:pPr lvl="0"/>
+            <a:r>
+              <a:rPr lang="en-US" dirty="0"/>
+              <a:t>Cao, Y., Chen, Z., Li, S. and Wu, S. (2018). </a:t>
+            </a:r>
+            <a:r>
+              <a:rPr lang="en-US" i="1" dirty="0"/>
+              <a:t>Deterministic Browser</a:t>
+            </a:r>
+            <a:r>
+              <a:rPr lang="en-US" dirty="0"/>
+              <a:t>. [online] Arxiv.org. Available at: https://arxiv.org/abs/1708.06774 [Accessed 28 Nov. 2018].</a:t>
+            </a:r>
+          </a:p>
+          <a:p>
+            <a:pPr lvl="0"/>
+            <a:r>
+              <a:rPr lang="en-US" dirty="0"/>
+              <a:t>Chen, P., Yang, S., McCann J., et al. (2018). </a:t>
+            </a:r>
+            <a:r>
+              <a:rPr lang="en-US" i="1" dirty="0"/>
+              <a:t>Detection of false data injection attacks in smart-grid systems - IEEE Journals &amp; Magazine</a:t>
+            </a:r>
+            <a:r>
+              <a:rPr lang="en-US" dirty="0"/>
+              <a:t>. </a:t>
+            </a:r>
+          </a:p>
+          <a:p>
+            <a:pPr lvl="0"/>
             <a:r>
               <a:rPr lang="en-US" dirty="0"/>
               <a:t>Liu, Y., Reiter, M. and Ning, P. (2018). </a:t>
@@ -4650,20 +5889,6 @@
             <a:r>
               <a:rPr lang="en-US" dirty="0"/>
               <a:t>.</a:t>
-            </a:r>
-          </a:p>
-          <a:p>
-            <a:r>
-              <a:rPr lang="en-US" dirty="0"/>
-              <a:t>Chen, P., Yang, S., McCann J., et al. (2018). </a:t>
-            </a:r>
-            <a:r>
-              <a:rPr lang="en-US" i="1" dirty="0"/>
-              <a:t>Detection of false data injection attacks in smart-grid systems - IEEE Journals &amp; Magazine</a:t>
-            </a:r>
-            <a:r>
-              <a:rPr lang="en-US" dirty="0"/>
-              <a:t>. </a:t>
             </a:r>
           </a:p>
         </p:txBody>
@@ -4955,7 +6180,7 @@
           <a:p>
             <a:r>
               <a:rPr lang="en-US" dirty="0"/>
-              <a:t> Attacks influences the distribution, end user, and service provider.</a:t>
+              <a:t>Attacks influences the distribution, end user, and service provider.</a:t>
             </a:r>
           </a:p>
           <a:p>
@@ -5169,7 +6394,7 @@
         </p:nvSpPr>
         <p:spPr>
           <a:xfrm>
-            <a:off x="838200" y="365125"/>
+            <a:off x="838200" y="99209"/>
             <a:ext cx="10515600" cy="1325563"/>
           </a:xfrm>
         </p:spPr>
@@ -5178,155 +6403,8 @@
           <a:lstStyle/>
           <a:p>
             <a:r>
-              <a:rPr lang="en-US"/>
+              <a:rPr lang="en-US" dirty="0"/>
               <a:t>…But the basics matter</a:t>
-            </a:r>
-            <a:endParaRPr lang="en-US" dirty="0"/>
-          </a:p>
-        </p:txBody>
-      </p:sp>
-      <p:pic>
-        <p:nvPicPr>
-          <p:cNvPr id="5" name="Picture 4">
-            <a:extLst>
-              <a:ext uri="{FF2B5EF4-FFF2-40B4-BE49-F238E27FC236}">
-                <a16:creationId xmlns:a16="http://schemas.microsoft.com/office/drawing/2014/main" id="{3584058C-4DBC-49D2-A085-46E0E1E5C751}"/>
-              </a:ext>
-            </a:extLst>
-          </p:cNvPr>
-          <p:cNvPicPr>
-            <a:picLocks noChangeAspect="1"/>
-          </p:cNvPicPr>
-          <p:nvPr/>
-        </p:nvPicPr>
-        <p:blipFill>
-          <a:blip r:embed="rId3"/>
-          <a:stretch>
-            <a:fillRect/>
-          </a:stretch>
-        </p:blipFill>
-        <p:spPr>
-          <a:xfrm>
-            <a:off x="5786371" y="1483423"/>
-            <a:ext cx="5567429" cy="3688708"/>
-          </a:xfrm>
-          <a:prstGeom prst="rect">
-            <a:avLst/>
-          </a:prstGeom>
-          <a:ln w="12700">
-            <a:solidFill>
-              <a:schemeClr val="tx1"/>
-            </a:solidFill>
-          </a:ln>
-        </p:spPr>
-      </p:pic>
-      <p:sp>
-        <p:nvSpPr>
-          <p:cNvPr id="6" name="TextBox 5">
-            <a:extLst>
-              <a:ext uri="{FF2B5EF4-FFF2-40B4-BE49-F238E27FC236}">
-                <a16:creationId xmlns:a16="http://schemas.microsoft.com/office/drawing/2014/main" id="{A6FFA584-1915-4E78-9FDE-D8559114FC03}"/>
-              </a:ext>
-            </a:extLst>
-          </p:cNvPr>
-          <p:cNvSpPr txBox="1"/>
-          <p:nvPr/>
-        </p:nvSpPr>
-        <p:spPr>
-          <a:xfrm>
-            <a:off x="5786371" y="5314027"/>
-            <a:ext cx="4754252" cy="307777"/>
-          </a:xfrm>
-          <a:prstGeom prst="rect">
-            <a:avLst/>
-          </a:prstGeom>
-          <a:noFill/>
-        </p:spPr>
-        <p:txBody>
-          <a:bodyPr wrap="square" rtlCol="0">
-            <a:spAutoFit/>
-          </a:bodyPr>
-          <a:lstStyle/>
-          <a:p>
-            <a:r>
-              <a:rPr lang="en-US" sz="1400" dirty="0"/>
-              <a:t>https://www.youtube.com/watch?v=CjrJjMNrqsI</a:t>
-            </a:r>
-          </a:p>
-        </p:txBody>
-      </p:sp>
-      <p:pic>
-        <p:nvPicPr>
-          <p:cNvPr id="8" name="Picture 7" descr="A screenshot of a cell phone&#10;&#10;Description automatically generated">
-            <a:extLst>
-              <a:ext uri="{FF2B5EF4-FFF2-40B4-BE49-F238E27FC236}">
-                <a16:creationId xmlns:a16="http://schemas.microsoft.com/office/drawing/2014/main" id="{72F44A3F-3943-493E-A5EE-D473EE160FC2}"/>
-              </a:ext>
-            </a:extLst>
-          </p:cNvPr>
-          <p:cNvPicPr>
-            <a:picLocks noChangeAspect="1"/>
-          </p:cNvPicPr>
-          <p:nvPr/>
-        </p:nvPicPr>
-        <p:blipFill>
-          <a:blip r:embed="rId4">
-            <a:extLst>
-              <a:ext uri="{28A0092B-C50C-407E-A947-70E740481C1C}">
-                <a14:useLocalDpi xmlns:a14="http://schemas.microsoft.com/office/drawing/2010/main" val="0"/>
-              </a:ext>
-            </a:extLst>
-          </a:blip>
-          <a:stretch>
-            <a:fillRect/>
-          </a:stretch>
-        </p:blipFill>
-        <p:spPr>
-          <a:xfrm>
-            <a:off x="838200" y="1483423"/>
-            <a:ext cx="3886389" cy="4165363"/>
-          </a:xfrm>
-          <a:prstGeom prst="rect">
-            <a:avLst/>
-          </a:prstGeom>
-          <a:ln w="12700">
-            <a:solidFill>
-              <a:schemeClr val="tx1"/>
-            </a:solidFill>
-          </a:ln>
-        </p:spPr>
-      </p:pic>
-      <p:sp>
-        <p:nvSpPr>
-          <p:cNvPr id="11" name="TextBox 10">
-            <a:extLst>
-              <a:ext uri="{FF2B5EF4-FFF2-40B4-BE49-F238E27FC236}">
-                <a16:creationId xmlns:a16="http://schemas.microsoft.com/office/drawing/2014/main" id="{D40F0EAD-A112-41DF-9F92-61619E8FCBCA}"/>
-              </a:ext>
-            </a:extLst>
-          </p:cNvPr>
-          <p:cNvSpPr txBox="1"/>
-          <p:nvPr/>
-        </p:nvSpPr>
-        <p:spPr>
-          <a:xfrm>
-            <a:off x="653592" y="5883391"/>
-            <a:ext cx="4754252" cy="523220"/>
-          </a:xfrm>
-          <a:prstGeom prst="rect">
-            <a:avLst/>
-          </a:prstGeom>
-          <a:noFill/>
-        </p:spPr>
-        <p:txBody>
-          <a:bodyPr wrap="square" rtlCol="0">
-            <a:spAutoFit/>
-          </a:bodyPr>
-          <a:lstStyle/>
-          <a:p>
-            <a:r>
-              <a:rPr lang="en-US" sz="1400" dirty="0"/>
-              <a:t>https://krebsonsecurity.com/2012/04/fbi-smart-meter-hacks-likely-to-spread/comment-page-1/</a:t>
             </a:r>
           </a:p>
         </p:txBody>
@@ -5347,6 +6425,14 @@
 <file path=ppt/slides/slide6.xml><?xml version="1.0" encoding="utf-8"?>
 <p:sld xmlns:a="http://schemas.openxmlformats.org/drawingml/2006/main" xmlns:r="http://schemas.openxmlformats.org/officeDocument/2006/relationships" xmlns:p="http://schemas.openxmlformats.org/presentationml/2006/main">
   <p:cSld>
+    <p:bg>
+      <p:bgPr>
+        <a:solidFill>
+          <a:schemeClr val="bg1"/>
+        </a:solidFill>
+        <a:effectLst/>
+      </p:bgPr>
+    </p:bg>
     <p:spTree>
       <p:nvGrpSpPr>
         <p:cNvPr id="1" name=""/>
@@ -5363,10 +6449,73 @@
       </p:grpSpPr>
       <p:sp>
         <p:nvSpPr>
+          <p:cNvPr id="10" name="Rectangle 9">
+            <a:extLst>
+              <a:ext uri="{FF2B5EF4-FFF2-40B4-BE49-F238E27FC236}">
+                <a16:creationId xmlns:a16="http://schemas.microsoft.com/office/drawing/2014/main" id="{A4AC5506-6312-4701-8D3C-40187889A947}"/>
+              </a:ext>
+              <a:ext uri="{C183D7F6-B498-43B3-948B-1728B52AA6E4}">
+                <adec:decorative xmlns:adec="http://schemas.microsoft.com/office/drawing/2017/decorative" val="1"/>
+              </a:ext>
+            </a:extLst>
+          </p:cNvPr>
+          <p:cNvSpPr>
+            <a:spLocks noGrp="1" noRot="1" noChangeAspect="1" noMove="1" noResize="1" noEditPoints="1" noAdjustHandles="1" noChangeArrowheads="1" noChangeShapeType="1" noTextEdit="1"/>
+          </p:cNvSpPr>
+          <p:nvPr>
+            <p:extLst>
+              <p:ext uri="{386F3935-93C4-4BCD-93E2-E3B085C9AB24}">
+                <p16:designElem xmlns:p16="http://schemas.microsoft.com/office/powerpoint/2015/main" val="1"/>
+              </p:ext>
+            </p:extLst>
+          </p:nvPr>
+        </p:nvSpPr>
+        <p:spPr>
+          <a:xfrm>
+            <a:off x="0" y="651752"/>
+            <a:ext cx="12192000" cy="736551"/>
+          </a:xfrm>
+          <a:prstGeom prst="rect">
+            <a:avLst/>
+          </a:prstGeom>
+          <a:solidFill>
+            <a:schemeClr val="tx1"/>
+          </a:solidFill>
+          <a:ln>
+            <a:noFill/>
+          </a:ln>
+        </p:spPr>
+        <p:style>
+          <a:lnRef idx="2">
+            <a:schemeClr val="accent1">
+              <a:shade val="50000"/>
+            </a:schemeClr>
+          </a:lnRef>
+          <a:fillRef idx="1">
+            <a:schemeClr val="accent1"/>
+          </a:fillRef>
+          <a:effectRef idx="0">
+            <a:schemeClr val="accent1"/>
+          </a:effectRef>
+          <a:fontRef idx="minor">
+            <a:schemeClr val="lt1"/>
+          </a:fontRef>
+        </p:style>
+        <p:txBody>
+          <a:bodyPr rtlCol="0" anchor="ctr"/>
+          <a:lstStyle/>
+          <a:p>
+            <a:pPr algn="ctr"/>
+            <a:endParaRPr lang="en-US"/>
+          </a:p>
+        </p:txBody>
+      </p:sp>
+      <p:sp>
+        <p:nvSpPr>
           <p:cNvPr id="2" name="Title 1">
             <a:extLst>
               <a:ext uri="{FF2B5EF4-FFF2-40B4-BE49-F238E27FC236}">
-                <a16:creationId xmlns:a16="http://schemas.microsoft.com/office/drawing/2014/main" id="{1CB0A0FA-C9D7-4D3F-A602-87E27DDA81DA}"/>
+                <a16:creationId xmlns:a16="http://schemas.microsoft.com/office/drawing/2014/main" id="{9F5D4530-152A-40C0-BBD4-7E978C13B749}"/>
               </a:ext>
             </a:extLst>
           </p:cNvPr>
@@ -5377,94 +6526,178 @@
             <p:ph type="title"/>
           </p:nvPr>
         </p:nvSpPr>
-        <p:spPr/>
-        <p:txBody>
-          <a:bodyPr/>
-          <a:lstStyle/>
-          <a:p>
-            <a:r>
-              <a:rPr lang="en-US" dirty="0"/>
-              <a:t>Defense for False Data Injection</a:t>
-            </a:r>
-          </a:p>
-        </p:txBody>
-      </p:sp>
-      <p:sp>
-        <p:nvSpPr>
-          <p:cNvPr id="3" name="Content Placeholder 2">
-            <a:extLst>
-              <a:ext uri="{FF2B5EF4-FFF2-40B4-BE49-F238E27FC236}">
-                <a16:creationId xmlns:a16="http://schemas.microsoft.com/office/drawing/2014/main" id="{C72F0B91-40EC-4471-93C9-28BA51723AFF}"/>
-              </a:ext>
-            </a:extLst>
-          </p:cNvPr>
-          <p:cNvSpPr>
-            <a:spLocks noGrp="1"/>
-          </p:cNvSpPr>
-          <p:nvPr>
-            <p:ph idx="1"/>
-          </p:nvPr>
-        </p:nvSpPr>
-        <p:spPr/>
-        <p:txBody>
-          <a:bodyPr/>
-          <a:lstStyle/>
-          <a:p>
-            <a:r>
-              <a:rPr lang="en-US" dirty="0"/>
-              <a:t>Implement IEC 62056-21</a:t>
-            </a:r>
-          </a:p>
-          <a:p>
-            <a:pPr lvl="1"/>
-            <a:r>
-              <a:rPr lang="en-US" dirty="0"/>
-              <a:t>Adds passwords, both simple and encrypted</a:t>
-            </a:r>
-          </a:p>
-          <a:p>
-            <a:pPr lvl="1"/>
-            <a:r>
-              <a:rPr lang="en-US" dirty="0"/>
-              <a:t>Adds handshaking</a:t>
-            </a:r>
-          </a:p>
-          <a:p>
-            <a:pPr lvl="1"/>
-            <a:r>
-              <a:rPr lang="en-US" dirty="0"/>
-              <a:t>Still vulnerable to attacks, but better than nothing</a:t>
-            </a:r>
-          </a:p>
-          <a:p>
-            <a:r>
-              <a:rPr lang="en-US" dirty="0"/>
-              <a:t>Machine learning algorithms</a:t>
-            </a:r>
-          </a:p>
-          <a:p>
-            <a:pPr lvl="1"/>
-            <a:r>
-              <a:rPr lang="en-US" dirty="0"/>
-              <a:t>Dealing with low-risk part of the grid</a:t>
-            </a:r>
-          </a:p>
-          <a:p>
-            <a:pPr lvl="1"/>
-            <a:r>
-              <a:rPr lang="en-US" dirty="0"/>
-              <a:t>Can provide additional information and adaptable</a:t>
-            </a:r>
-          </a:p>
-          <a:p>
-            <a:endParaRPr lang="en-US" dirty="0"/>
-          </a:p>
-        </p:txBody>
-      </p:sp>
+        <p:spPr>
+          <a:xfrm>
+            <a:off x="556532" y="643467"/>
+            <a:ext cx="11210925" cy="744836"/>
+          </a:xfrm>
+        </p:spPr>
+        <p:txBody>
+          <a:bodyPr vert="horz" lIns="91440" tIns="45720" rIns="91440" bIns="45720" rtlCol="0" anchor="ctr">
+            <a:normAutofit/>
+          </a:bodyPr>
+          <a:lstStyle/>
+          <a:p>
+            <a:pPr algn="ctr"/>
+            <a:r>
+              <a:rPr lang="en-US" sz="3200" kern="1200" dirty="0">
+                <a:solidFill>
+                  <a:schemeClr val="bg1"/>
+                </a:solidFill>
+                <a:latin typeface="+mj-lt"/>
+                <a:ea typeface="+mj-ea"/>
+                <a:cs typeface="+mj-cs"/>
+              </a:rPr>
+              <a:t>…But the basics matter</a:t>
+            </a:r>
+          </a:p>
+        </p:txBody>
+      </p:sp>
+      <p:sp>
+        <p:nvSpPr>
+          <p:cNvPr id="5" name="TextBox 4">
+            <a:extLst>
+              <a:ext uri="{FF2B5EF4-FFF2-40B4-BE49-F238E27FC236}">
+                <a16:creationId xmlns:a16="http://schemas.microsoft.com/office/drawing/2014/main" id="{273D0F92-A99D-442F-8119-93B1E34CE2EE}"/>
+              </a:ext>
+            </a:extLst>
+          </p:cNvPr>
+          <p:cNvSpPr txBox="1"/>
+          <p:nvPr/>
+        </p:nvSpPr>
+        <p:spPr>
+          <a:xfrm>
+            <a:off x="5806691" y="6066271"/>
+            <a:ext cx="4754252" cy="307777"/>
+          </a:xfrm>
+          <a:prstGeom prst="rect">
+            <a:avLst/>
+          </a:prstGeom>
+          <a:noFill/>
+        </p:spPr>
+        <p:txBody>
+          <a:bodyPr wrap="square" rtlCol="0">
+            <a:spAutoFit/>
+          </a:bodyPr>
+          <a:lstStyle/>
+          <a:p>
+            <a:r>
+              <a:rPr lang="en-US" sz="1400" dirty="0"/>
+              <a:t>https://www.youtube.com/watch?v=CjrJjMNrqsI</a:t>
+            </a:r>
+          </a:p>
+        </p:txBody>
+      </p:sp>
+      <p:pic>
+        <p:nvPicPr>
+          <p:cNvPr id="7" name="Picture 6" descr="A screenshot of a cell phone&#10;&#10;Description automatically generated">
+            <a:extLst>
+              <a:ext uri="{FF2B5EF4-FFF2-40B4-BE49-F238E27FC236}">
+                <a16:creationId xmlns:a16="http://schemas.microsoft.com/office/drawing/2014/main" id="{08CD62C9-A718-4D67-AECC-B756E84C6F5E}"/>
+              </a:ext>
+            </a:extLst>
+          </p:cNvPr>
+          <p:cNvPicPr>
+            <a:picLocks noChangeAspect="1"/>
+          </p:cNvPicPr>
+          <p:nvPr/>
+        </p:nvPicPr>
+        <p:blipFill>
+          <a:blip r:embed="rId3">
+            <a:extLst>
+              <a:ext uri="{28A0092B-C50C-407E-A947-70E740481C1C}">
+                <a14:useLocalDpi xmlns:a14="http://schemas.microsoft.com/office/drawing/2010/main" val="0"/>
+              </a:ext>
+            </a:extLst>
+          </a:blip>
+          <a:stretch>
+            <a:fillRect/>
+          </a:stretch>
+        </p:blipFill>
+        <p:spPr>
+          <a:xfrm>
+            <a:off x="848360" y="1666303"/>
+            <a:ext cx="3886389" cy="4165363"/>
+          </a:xfrm>
+          <a:prstGeom prst="rect">
+            <a:avLst/>
+          </a:prstGeom>
+          <a:ln w="12700">
+            <a:solidFill>
+              <a:schemeClr val="tx1"/>
+            </a:solidFill>
+          </a:ln>
+        </p:spPr>
+      </p:pic>
+      <p:sp>
+        <p:nvSpPr>
+          <p:cNvPr id="8" name="TextBox 7">
+            <a:extLst>
+              <a:ext uri="{FF2B5EF4-FFF2-40B4-BE49-F238E27FC236}">
+                <a16:creationId xmlns:a16="http://schemas.microsoft.com/office/drawing/2014/main" id="{471EFC42-5A4D-443E-9168-D70D79E7B98B}"/>
+              </a:ext>
+            </a:extLst>
+          </p:cNvPr>
+          <p:cNvSpPr txBox="1"/>
+          <p:nvPr/>
+        </p:nvSpPr>
+        <p:spPr>
+          <a:xfrm>
+            <a:off x="663752" y="6066271"/>
+            <a:ext cx="4754252" cy="523220"/>
+          </a:xfrm>
+          <a:prstGeom prst="rect">
+            <a:avLst/>
+          </a:prstGeom>
+          <a:noFill/>
+        </p:spPr>
+        <p:txBody>
+          <a:bodyPr wrap="square" rtlCol="0">
+            <a:spAutoFit/>
+          </a:bodyPr>
+          <a:lstStyle/>
+          <a:p>
+            <a:r>
+              <a:rPr lang="en-US" sz="1400" dirty="0"/>
+              <a:t>https://krebsonsecurity.com/2012/04/fbi-smart-meter-hacks-likely-to-spread/comment-page-1/</a:t>
+            </a:r>
+          </a:p>
+        </p:txBody>
+      </p:sp>
+      <p:pic>
+        <p:nvPicPr>
+          <p:cNvPr id="9" name="Picture 8">
+            <a:extLst>
+              <a:ext uri="{FF2B5EF4-FFF2-40B4-BE49-F238E27FC236}">
+                <a16:creationId xmlns:a16="http://schemas.microsoft.com/office/drawing/2014/main" id="{6770586C-372B-4C02-AB86-2C52F2F9B0C2}"/>
+              </a:ext>
+            </a:extLst>
+          </p:cNvPr>
+          <p:cNvPicPr>
+            <a:picLocks noChangeAspect="1"/>
+          </p:cNvPicPr>
+          <p:nvPr/>
+        </p:nvPicPr>
+        <p:blipFill>
+          <a:blip r:embed="rId4"/>
+          <a:stretch>
+            <a:fillRect/>
+          </a:stretch>
+        </p:blipFill>
+        <p:spPr>
+          <a:xfrm>
+            <a:off x="5418004" y="1732569"/>
+            <a:ext cx="6242330" cy="4216400"/>
+          </a:xfrm>
+          <a:prstGeom prst="rect">
+            <a:avLst/>
+          </a:prstGeom>
+        </p:spPr>
+      </p:pic>
     </p:spTree>
     <p:extLst>
       <p:ext uri="{BB962C8B-B14F-4D97-AF65-F5344CB8AC3E}">
-        <p14:creationId xmlns:p14="http://schemas.microsoft.com/office/powerpoint/2010/main" val="486765307"/>
+        <p14:creationId xmlns:p14="http://schemas.microsoft.com/office/powerpoint/2010/main" val="3612303682"/>
       </p:ext>
     </p:extLst>
   </p:cSld>
@@ -5496,7 +6729,7 @@
           <p:cNvPr id="2" name="Title 1">
             <a:extLst>
               <a:ext uri="{FF2B5EF4-FFF2-40B4-BE49-F238E27FC236}">
-                <a16:creationId xmlns:a16="http://schemas.microsoft.com/office/drawing/2014/main" id="{1A1315C2-00C6-4AC0-BD14-C48CF1DCFF00}"/>
+                <a16:creationId xmlns:a16="http://schemas.microsoft.com/office/drawing/2014/main" id="{1CB0A0FA-C9D7-4D3F-A602-87E27DDA81DA}"/>
               </a:ext>
             </a:extLst>
           </p:cNvPr>
@@ -5512,7 +6745,10 @@
           <a:bodyPr/>
           <a:lstStyle/>
           <a:p>
-            <a:endParaRPr lang="en-US"/>
+            <a:r>
+              <a:rPr lang="en-US" dirty="0"/>
+              <a:t>Defense for False Data Injection</a:t>
+            </a:r>
           </a:p>
         </p:txBody>
       </p:sp>
@@ -5521,7 +6757,7 @@
           <p:cNvPr id="3" name="Content Placeholder 2">
             <a:extLst>
               <a:ext uri="{FF2B5EF4-FFF2-40B4-BE49-F238E27FC236}">
-                <a16:creationId xmlns:a16="http://schemas.microsoft.com/office/drawing/2014/main" id="{B0E70B00-AABF-40C9-815A-733697359B6C}"/>
+                <a16:creationId xmlns:a16="http://schemas.microsoft.com/office/drawing/2014/main" id="{C72F0B91-40EC-4471-93C9-28BA51723AFF}"/>
               </a:ext>
             </a:extLst>
           </p:cNvPr>
@@ -5537,14 +6773,61 @@
           <a:bodyPr/>
           <a:lstStyle/>
           <a:p>
-            <a:endParaRPr lang="en-US"/>
+            <a:r>
+              <a:rPr lang="en-US" dirty="0"/>
+              <a:t>Implement IEC 62056-21</a:t>
+            </a:r>
+          </a:p>
+          <a:p>
+            <a:pPr lvl="1"/>
+            <a:r>
+              <a:rPr lang="en-US" dirty="0"/>
+              <a:t>Adds passwords, both simple and encrypted</a:t>
+            </a:r>
+          </a:p>
+          <a:p>
+            <a:pPr lvl="1"/>
+            <a:r>
+              <a:rPr lang="en-US" dirty="0"/>
+              <a:t>Adds handshaking</a:t>
+            </a:r>
+          </a:p>
+          <a:p>
+            <a:pPr lvl="1"/>
+            <a:r>
+              <a:rPr lang="en-US" dirty="0"/>
+              <a:t>Still vulnerable to attacks, but better than nothing</a:t>
+            </a:r>
+          </a:p>
+          <a:p>
+            <a:r>
+              <a:rPr lang="en-US" dirty="0"/>
+              <a:t>Machine learning algorithms</a:t>
+            </a:r>
+          </a:p>
+          <a:p>
+            <a:pPr lvl="1"/>
+            <a:r>
+              <a:rPr lang="en-US" dirty="0"/>
+              <a:t>Dealing with low-risk part of the grid</a:t>
+            </a:r>
+          </a:p>
+          <a:p>
+            <a:pPr lvl="1"/>
+            <a:r>
+              <a:rPr lang="en-US" dirty="0"/>
+              <a:t>Can provide additional information and adaptable</a:t>
+            </a:r>
+          </a:p>
+          <a:p>
+            <a:endParaRPr lang="en-US" dirty="0"/>
           </a:p>
         </p:txBody>
       </p:sp>
     </p:spTree>
     <p:extLst>
       <p:ext uri="{BB962C8B-B14F-4D97-AF65-F5344CB8AC3E}">
-        <p14:creationId xmlns:p14="http://schemas.microsoft.com/office/powerpoint/2010/main" val="3753109332"/>
+        <p14:creationId xmlns:p14="http://schemas.microsoft.com/office/powerpoint/2010/main" val="486765307"/>
       </p:ext>
     </p:extLst>
   </p:cSld>
@@ -5576,7 +6859,7 @@
           <p:cNvPr id="2" name="Title 1">
             <a:extLst>
               <a:ext uri="{FF2B5EF4-FFF2-40B4-BE49-F238E27FC236}">
-                <a16:creationId xmlns:a16="http://schemas.microsoft.com/office/drawing/2014/main" id="{36BC3588-21B1-4E0D-B369-CE96ABF26ACC}"/>
+                <a16:creationId xmlns:a16="http://schemas.microsoft.com/office/drawing/2014/main" id="{1A1315C2-00C6-4AC0-BD14-C48CF1DCFF00}"/>
               </a:ext>
             </a:extLst>
           </p:cNvPr>
@@ -5592,7 +6875,10 @@
           <a:bodyPr/>
           <a:lstStyle/>
           <a:p>
-            <a:endParaRPr lang="en-US"/>
+            <a:r>
+              <a:rPr lang="en-US" dirty="0"/>
+              <a:t>Popping HMI attack</a:t>
+            </a:r>
           </a:p>
         </p:txBody>
       </p:sp>
@@ -5601,7 +6887,7 @@
           <p:cNvPr id="3" name="Content Placeholder 2">
             <a:extLst>
               <a:ext uri="{FF2B5EF4-FFF2-40B4-BE49-F238E27FC236}">
-                <a16:creationId xmlns:a16="http://schemas.microsoft.com/office/drawing/2014/main" id="{9D2BA97B-47BB-4E26-9D73-A024EF177C32}"/>
+                <a16:creationId xmlns:a16="http://schemas.microsoft.com/office/drawing/2014/main" id="{B0E70B00-AABF-40C9-815A-733697359B6C}"/>
               </a:ext>
             </a:extLst>
           </p:cNvPr>
@@ -5614,17 +6900,69 @@
         </p:nvSpPr>
         <p:spPr/>
         <p:txBody>
-          <a:bodyPr/>
-          <a:lstStyle/>
-          <a:p>
-            <a:endParaRPr lang="en-US"/>
+          <a:bodyPr>
+            <a:normAutofit lnSpcReduction="10000"/>
+          </a:bodyPr>
+          <a:lstStyle/>
+          <a:p>
+            <a:r>
+              <a:rPr lang="en-US" dirty="0"/>
+              <a:t>Lots of different vectors, but let’s focus on timing attacks.</a:t>
+            </a:r>
+          </a:p>
+          <a:p>
+            <a:r>
+              <a:rPr lang="en-US" dirty="0"/>
+              <a:t>Attacker’s aim to discover network topology</a:t>
+            </a:r>
+          </a:p>
+          <a:p>
+            <a:pPr lvl="1"/>
+            <a:r>
+              <a:rPr lang="en-US" dirty="0"/>
+              <a:t>On power generation realm</a:t>
+            </a:r>
+          </a:p>
+          <a:p>
+            <a:pPr lvl="1"/>
+            <a:r>
+              <a:rPr lang="en-US" dirty="0"/>
+              <a:t>Especially target devices that return either &lt;3msec or &lt;10msec according to IEC 61850</a:t>
+            </a:r>
+          </a:p>
+          <a:p>
+            <a:pPr lvl="1"/>
+            <a:r>
+              <a:rPr lang="en-US" dirty="0"/>
+              <a:t>Attack on privacy and security</a:t>
+            </a:r>
+          </a:p>
+          <a:p>
+            <a:r>
+              <a:rPr lang="en-US" dirty="0"/>
+              <a:t>Attacker can exploit the web browser to gain information of critical systems.</a:t>
+            </a:r>
+          </a:p>
+          <a:p>
+            <a:pPr lvl="1"/>
+            <a:r>
+              <a:rPr lang="en-US" dirty="0"/>
+              <a:t>Request information of target systems in substation</a:t>
+            </a:r>
+          </a:p>
+          <a:p>
+            <a:pPr lvl="1"/>
+            <a:r>
+              <a:rPr lang="en-US" dirty="0"/>
+              <a:t>Over a large sample of requests, the timing of the device can be traced to specific devices</a:t>
+            </a:r>
           </a:p>
         </p:txBody>
       </p:sp>
     </p:spTree>
     <p:extLst>
       <p:ext uri="{BB962C8B-B14F-4D97-AF65-F5344CB8AC3E}">
-        <p14:creationId xmlns:p14="http://schemas.microsoft.com/office/powerpoint/2010/main" val="575843591"/>
+        <p14:creationId xmlns:p14="http://schemas.microsoft.com/office/powerpoint/2010/main" val="3753109332"/>
       </p:ext>
     </p:extLst>
   </p:cSld>
@@ -5637,6 +6975,14 @@
 <file path=ppt/slides/slide9.xml><?xml version="1.0" encoding="utf-8"?>
 <p:sld xmlns:a="http://schemas.openxmlformats.org/drawingml/2006/main" xmlns:r="http://schemas.openxmlformats.org/officeDocument/2006/relationships" xmlns:p="http://schemas.openxmlformats.org/presentationml/2006/main">
   <p:cSld>
+    <p:bg>
+      <p:bgPr>
+        <a:solidFill>
+          <a:schemeClr val="bg1"/>
+        </a:solidFill>
+        <a:effectLst/>
+      </p:bgPr>
+    </p:bg>
     <p:spTree>
       <p:nvGrpSpPr>
         <p:cNvPr id="1" name=""/>
@@ -5653,10 +6999,73 @@
       </p:grpSpPr>
       <p:sp>
         <p:nvSpPr>
+          <p:cNvPr id="10" name="Rectangle 9">
+            <a:extLst>
+              <a:ext uri="{FF2B5EF4-FFF2-40B4-BE49-F238E27FC236}">
+                <a16:creationId xmlns:a16="http://schemas.microsoft.com/office/drawing/2014/main" id="{A4AC5506-6312-4701-8D3C-40187889A947}"/>
+              </a:ext>
+              <a:ext uri="{C183D7F6-B498-43B3-948B-1728B52AA6E4}">
+                <adec:decorative xmlns:adec="http://schemas.microsoft.com/office/drawing/2017/decorative" val="1"/>
+              </a:ext>
+            </a:extLst>
+          </p:cNvPr>
+          <p:cNvSpPr>
+            <a:spLocks noGrp="1" noRot="1" noChangeAspect="1" noMove="1" noResize="1" noEditPoints="1" noAdjustHandles="1" noChangeArrowheads="1" noChangeShapeType="1" noTextEdit="1"/>
+          </p:cNvSpPr>
+          <p:nvPr>
+            <p:extLst>
+              <p:ext uri="{386F3935-93C4-4BCD-93E2-E3B085C9AB24}">
+                <p16:designElem xmlns:p16="http://schemas.microsoft.com/office/powerpoint/2015/main" val="1"/>
+              </p:ext>
+            </p:extLst>
+          </p:nvPr>
+        </p:nvSpPr>
+        <p:spPr>
+          <a:xfrm>
+            <a:off x="0" y="651752"/>
+            <a:ext cx="12192000" cy="736551"/>
+          </a:xfrm>
+          <a:prstGeom prst="rect">
+            <a:avLst/>
+          </a:prstGeom>
+          <a:solidFill>
+            <a:schemeClr val="tx1"/>
+          </a:solidFill>
+          <a:ln>
+            <a:noFill/>
+          </a:ln>
+        </p:spPr>
+        <p:style>
+          <a:lnRef idx="2">
+            <a:schemeClr val="accent1">
+              <a:shade val="50000"/>
+            </a:schemeClr>
+          </a:lnRef>
+          <a:fillRef idx="1">
+            <a:schemeClr val="accent1"/>
+          </a:fillRef>
+          <a:effectRef idx="0">
+            <a:schemeClr val="accent1"/>
+          </a:effectRef>
+          <a:fontRef idx="minor">
+            <a:schemeClr val="lt1"/>
+          </a:fontRef>
+        </p:style>
+        <p:txBody>
+          <a:bodyPr rtlCol="0" anchor="ctr"/>
+          <a:lstStyle/>
+          <a:p>
+            <a:pPr algn="ctr"/>
+            <a:endParaRPr lang="en-US"/>
+          </a:p>
+        </p:txBody>
+      </p:sp>
+      <p:sp>
+        <p:nvSpPr>
           <p:cNvPr id="2" name="Title 1">
             <a:extLst>
               <a:ext uri="{FF2B5EF4-FFF2-40B4-BE49-F238E27FC236}">
-                <a16:creationId xmlns:a16="http://schemas.microsoft.com/office/drawing/2014/main" id="{D481189B-A70F-4E41-9EC2-3CF67205FCB4}"/>
+                <a16:creationId xmlns:a16="http://schemas.microsoft.com/office/drawing/2014/main" id="{9F5D4530-152A-40C0-BBD4-7E978C13B749}"/>
               </a:ext>
             </a:extLst>
           </p:cNvPr>
@@ -5667,44 +7076,78 @@
             <p:ph type="title"/>
           </p:nvPr>
         </p:nvSpPr>
-        <p:spPr/>
-        <p:txBody>
-          <a:bodyPr/>
-          <a:lstStyle/>
-          <a:p>
-            <a:endParaRPr lang="en-US"/>
-          </a:p>
-        </p:txBody>
-      </p:sp>
-      <p:sp>
-        <p:nvSpPr>
-          <p:cNvPr id="3" name="Content Placeholder 2">
-            <a:extLst>
-              <a:ext uri="{FF2B5EF4-FFF2-40B4-BE49-F238E27FC236}">
-                <a16:creationId xmlns:a16="http://schemas.microsoft.com/office/drawing/2014/main" id="{20289608-DF40-462D-9D78-3E00BFBCF1DE}"/>
-              </a:ext>
-            </a:extLst>
-          </p:cNvPr>
-          <p:cNvSpPr>
-            <a:spLocks noGrp="1"/>
-          </p:cNvSpPr>
-          <p:nvPr>
-            <p:ph idx="1"/>
-          </p:nvPr>
-        </p:nvSpPr>
-        <p:spPr/>
-        <p:txBody>
-          <a:bodyPr/>
-          <a:lstStyle/>
-          <a:p>
-            <a:endParaRPr lang="en-US"/>
-          </a:p>
-        </p:txBody>
-      </p:sp>
+        <p:spPr>
+          <a:xfrm>
+            <a:off x="556532" y="643467"/>
+            <a:ext cx="11210925" cy="744836"/>
+          </a:xfrm>
+        </p:spPr>
+        <p:txBody>
+          <a:bodyPr vert="horz" lIns="91440" tIns="45720" rIns="91440" bIns="45720" rtlCol="0" anchor="ctr">
+            <a:normAutofit/>
+          </a:bodyPr>
+          <a:lstStyle/>
+          <a:p>
+            <a:pPr algn="ctr"/>
+            <a:r>
+              <a:rPr lang="en-US" sz="3200" kern="1200">
+                <a:solidFill>
+                  <a:schemeClr val="bg1"/>
+                </a:solidFill>
+                <a:latin typeface="+mj-lt"/>
+                <a:ea typeface="+mj-ea"/>
+                <a:cs typeface="+mj-cs"/>
+              </a:rPr>
+              <a:t>HMI examples</a:t>
+            </a:r>
+          </a:p>
+        </p:txBody>
+      </p:sp>
+      <p:pic>
+        <p:nvPicPr>
+          <p:cNvPr id="6" name="Content Placeholder 3">
+            <a:extLst>
+              <a:ext uri="{FF2B5EF4-FFF2-40B4-BE49-F238E27FC236}">
+                <a16:creationId xmlns:a16="http://schemas.microsoft.com/office/drawing/2014/main" id="{2B605C64-C035-440D-AA4B-3E8FCA307986}"/>
+              </a:ext>
+            </a:extLst>
+          </p:cNvPr>
+          <p:cNvPicPr>
+            <a:picLocks noChangeAspect="1"/>
+          </p:cNvPicPr>
+          <p:nvPr/>
+        </p:nvPicPr>
+        <p:blipFill>
+          <a:blip r:embed="rId2">
+            <a:extLst>
+              <a:ext uri="{28A0092B-C50C-407E-A947-70E740481C1C}">
+                <a14:useLocalDpi xmlns:a14="http://schemas.microsoft.com/office/drawing/2010/main" val="0"/>
+              </a:ext>
+            </a:extLst>
+          </a:blip>
+          <a:stretch>
+            <a:fillRect/>
+          </a:stretch>
+        </p:blipFill>
+        <p:spPr>
+          <a:xfrm>
+            <a:off x="2672080" y="1566488"/>
+            <a:ext cx="6847840" cy="5291512"/>
+          </a:xfrm>
+          <a:prstGeom prst="rect">
+            <a:avLst/>
+          </a:prstGeom>
+          <a:ln w="12700">
+            <a:solidFill>
+              <a:schemeClr val="tx1"/>
+            </a:solidFill>
+          </a:ln>
+        </p:spPr>
+      </p:pic>
     </p:spTree>
     <p:extLst>
       <p:ext uri="{BB962C8B-B14F-4D97-AF65-F5344CB8AC3E}">
-        <p14:creationId xmlns:p14="http://schemas.microsoft.com/office/powerpoint/2010/main" val="3912311376"/>
+        <p14:creationId xmlns:p14="http://schemas.microsoft.com/office/powerpoint/2010/main" val="2558085262"/>
       </p:ext>
     </p:extLst>
   </p:cSld>
@@ -6302,4 +7745,299 @@
     </a:ext>
   </a:extLst>
 </a:theme>
+</file>
+
+<file path=ppt/theme/theme3.xml><?xml version="1.0" encoding="utf-8"?>
+<a:theme xmlns:a="http://schemas.openxmlformats.org/drawingml/2006/main" name="Office Theme">
+  <a:themeElements>
+    <a:clrScheme name="Office">
+      <a:dk1>
+        <a:sysClr val="windowText" lastClr="000000"/>
+      </a:dk1>
+      <a:lt1>
+        <a:sysClr val="window" lastClr="FFFFFF"/>
+      </a:lt1>
+      <a:dk2>
+        <a:srgbClr val="44546A"/>
+      </a:dk2>
+      <a:lt2>
+        <a:srgbClr val="E7E6E6"/>
+      </a:lt2>
+      <a:accent1>
+        <a:srgbClr val="4472C4"/>
+      </a:accent1>
+      <a:accent2>
+        <a:srgbClr val="ED7D31"/>
+      </a:accent2>
+      <a:accent3>
+        <a:srgbClr val="A5A5A5"/>
+      </a:accent3>
+      <a:accent4>
+        <a:srgbClr val="FFC000"/>
+      </a:accent4>
+      <a:accent5>
+        <a:srgbClr val="5B9BD5"/>
+      </a:accent5>
+      <a:accent6>
+        <a:srgbClr val="70AD47"/>
+      </a:accent6>
+      <a:hlink>
+        <a:srgbClr val="0563C1"/>
+      </a:hlink>
+      <a:folHlink>
+        <a:srgbClr val="954F72"/>
+      </a:folHlink>
+    </a:clrScheme>
+    <a:fontScheme name="Office">
+      <a:majorFont>
+        <a:latin typeface="Calibri Light" panose="020F0302020204030204"/>
+        <a:ea typeface=""/>
+        <a:cs typeface=""/>
+        <a:font script="Jpan" typeface="游ゴシック Light"/>
+        <a:font script="Hang" typeface="맑은 고딕"/>
+        <a:font script="Hans" typeface="等线 Light"/>
+        <a:font script="Hant" typeface="新細明體"/>
+        <a:font script="Arab" typeface="Times New Roman"/>
+        <a:font script="Hebr" typeface="Times New Roman"/>
+        <a:font script="Thai" typeface="Angsana New"/>
+        <a:font script="Ethi" typeface="Nyala"/>
+        <a:font script="Beng" typeface="Vrinda"/>
+        <a:font script="Gujr" typeface="Shruti"/>
+        <a:font script="Khmr" typeface="MoolBoran"/>
+        <a:font script="Knda" typeface="Tunga"/>
+        <a:font script="Guru" typeface="Raavi"/>
+        <a:font script="Cans" typeface="Euphemia"/>
+        <a:font script="Cher" typeface="Plantagenet Cherokee"/>
+        <a:font script="Yiii" typeface="Microsoft Yi Baiti"/>
+        <a:font script="Tibt" typeface="Microsoft Himalaya"/>
+        <a:font script="Thaa" typeface="MV Boli"/>
+        <a:font script="Deva" typeface="Mangal"/>
+        <a:font script="Telu" typeface="Gautami"/>
+        <a:font script="Taml" typeface="Latha"/>
+        <a:font script="Syrc" typeface="Estrangelo Edessa"/>
+        <a:font script="Orya" typeface="Kalinga"/>
+        <a:font script="Mlym" typeface="Kartika"/>
+        <a:font script="Laoo" typeface="DokChampa"/>
+        <a:font script="Sinh" typeface="Iskoola Pota"/>
+        <a:font script="Mong" typeface="Mongolian Baiti"/>
+        <a:font script="Viet" typeface="Times New Roman"/>
+        <a:font script="Uigh" typeface="Microsoft Uighur"/>
+        <a:font script="Geor" typeface="Sylfaen"/>
+        <a:font script="Armn" typeface="Arial"/>
+        <a:font script="Bugi" typeface="Leelawadee UI"/>
+        <a:font script="Bopo" typeface="Microsoft JhengHei"/>
+        <a:font script="Java" typeface="Javanese Text"/>
+        <a:font script="Lisu" typeface="Segoe UI"/>
+        <a:font script="Mymr" typeface="Myanmar Text"/>
+        <a:font script="Nkoo" typeface="Ebrima"/>
+        <a:font script="Olck" typeface="Nirmala UI"/>
+        <a:font script="Osma" typeface="Ebrima"/>
+        <a:font script="Phag" typeface="Phagspa"/>
+        <a:font script="Syrn" typeface="Estrangelo Edessa"/>
+        <a:font script="Syrj" typeface="Estrangelo Edessa"/>
+        <a:font script="Syre" typeface="Estrangelo Edessa"/>
+        <a:font script="Sora" typeface="Nirmala UI"/>
+        <a:font script="Tale" typeface="Microsoft Tai Le"/>
+        <a:font script="Talu" typeface="Microsoft New Tai Lue"/>
+        <a:font script="Tfng" typeface="Ebrima"/>
+      </a:majorFont>
+      <a:minorFont>
+        <a:latin typeface="Calibri" panose="020F0502020204030204"/>
+        <a:ea typeface=""/>
+        <a:cs typeface=""/>
+        <a:font script="Jpan" typeface="游ゴシック"/>
+        <a:font script="Hang" typeface="맑은 고딕"/>
+        <a:font script="Hans" typeface="等线"/>
+        <a:font script="Hant" typeface="新細明體"/>
+        <a:font script="Arab" typeface="Arial"/>
+        <a:font script="Hebr" typeface="Arial"/>
+        <a:font script="Thai" typeface="Cordia New"/>
+        <a:font script="Ethi" typeface="Nyala"/>
+        <a:font script="Beng" typeface="Vrinda"/>
+        <a:font script="Gujr" typeface="Shruti"/>
+        <a:font script="Khmr" typeface="DaunPenh"/>
+        <a:font script="Knda" typeface="Tunga"/>
+        <a:font script="Guru" typeface="Raavi"/>
+        <a:font script="Cans" typeface="Euphemia"/>
+        <a:font script="Cher" typeface="Plantagenet Cherokee"/>
+        <a:font script="Yiii" typeface="Microsoft Yi Baiti"/>
+        <a:font script="Tibt" typeface="Microsoft Himalaya"/>
+        <a:font script="Thaa" typeface="MV Boli"/>
+        <a:font script="Deva" typeface="Mangal"/>
+        <a:font script="Telu" typeface="Gautami"/>
+        <a:font script="Taml" typeface="Latha"/>
+        <a:font script="Syrc" typeface="Estrangelo Edessa"/>
+        <a:font script="Orya" typeface="Kalinga"/>
+        <a:font script="Mlym" typeface="Kartika"/>
+        <a:font script="Laoo" typeface="DokChampa"/>
+        <a:font script="Sinh" typeface="Iskoola Pota"/>
+        <a:font script="Mong" typeface="Mongolian Baiti"/>
+        <a:font script="Viet" typeface="Arial"/>
+        <a:font script="Uigh" typeface="Microsoft Uighur"/>
+        <a:font script="Geor" typeface="Sylfaen"/>
+        <a:font script="Armn" typeface="Arial"/>
+        <a:font script="Bugi" typeface="Leelawadee UI"/>
+        <a:font script="Bopo" typeface="Microsoft JhengHei"/>
+        <a:font script="Java" typeface="Javanese Text"/>
+        <a:font script="Lisu" typeface="Segoe UI"/>
+        <a:font script="Mymr" typeface="Myanmar Text"/>
+        <a:font script="Nkoo" typeface="Ebrima"/>
+        <a:font script="Olck" typeface="Nirmala UI"/>
+        <a:font script="Osma" typeface="Ebrima"/>
+        <a:font script="Phag" typeface="Phagspa"/>
+        <a:font script="Syrn" typeface="Estrangelo Edessa"/>
+        <a:font script="Syrj" typeface="Estrangelo Edessa"/>
+        <a:font script="Syre" typeface="Estrangelo Edessa"/>
+        <a:font script="Sora" typeface="Nirmala UI"/>
+        <a:font script="Tale" typeface="Microsoft Tai Le"/>
+        <a:font script="Talu" typeface="Microsoft New Tai Lue"/>
+        <a:font script="Tfng" typeface="Ebrima"/>
+      </a:minorFont>
+    </a:fontScheme>
+    <a:fmtScheme name="Office">
+      <a:fillStyleLst>
+        <a:solidFill>
+          <a:schemeClr val="phClr"/>
+        </a:solidFill>
+        <a:gradFill rotWithShape="1">
+          <a:gsLst>
+            <a:gs pos="0">
+              <a:schemeClr val="phClr">
+                <a:lumMod val="110000"/>
+                <a:satMod val="105000"/>
+                <a:tint val="67000"/>
+              </a:schemeClr>
+            </a:gs>
+            <a:gs pos="50000">
+              <a:schemeClr val="phClr">
+                <a:lumMod val="105000"/>
+                <a:satMod val="103000"/>
+                <a:tint val="73000"/>
+              </a:schemeClr>
+            </a:gs>
+            <a:gs pos="100000">
+              <a:schemeClr val="phClr">
+                <a:lumMod val="105000"/>
+                <a:satMod val="109000"/>
+                <a:tint val="81000"/>
+              </a:schemeClr>
+            </a:gs>
+          </a:gsLst>
+          <a:lin ang="5400000" scaled="0"/>
+        </a:gradFill>
+        <a:gradFill rotWithShape="1">
+          <a:gsLst>
+            <a:gs pos="0">
+              <a:schemeClr val="phClr">
+                <a:satMod val="103000"/>
+                <a:lumMod val="102000"/>
+                <a:tint val="94000"/>
+              </a:schemeClr>
+            </a:gs>
+            <a:gs pos="50000">
+              <a:schemeClr val="phClr">
+                <a:satMod val="110000"/>
+                <a:lumMod val="100000"/>
+                <a:shade val="100000"/>
+              </a:schemeClr>
+            </a:gs>
+            <a:gs pos="100000">
+              <a:schemeClr val="phClr">
+                <a:lumMod val="99000"/>
+                <a:satMod val="120000"/>
+                <a:shade val="78000"/>
+              </a:schemeClr>
+            </a:gs>
+          </a:gsLst>
+          <a:lin ang="5400000" scaled="0"/>
+        </a:gradFill>
+      </a:fillStyleLst>
+      <a:lnStyleLst>
+        <a:ln w="6350" cap="flat" cmpd="sng" algn="ctr">
+          <a:solidFill>
+            <a:schemeClr val="phClr"/>
+          </a:solidFill>
+          <a:prstDash val="solid"/>
+          <a:miter lim="800000"/>
+        </a:ln>
+        <a:ln w="12700" cap="flat" cmpd="sng" algn="ctr">
+          <a:solidFill>
+            <a:schemeClr val="phClr"/>
+          </a:solidFill>
+          <a:prstDash val="solid"/>
+          <a:miter lim="800000"/>
+        </a:ln>
+        <a:ln w="19050" cap="flat" cmpd="sng" algn="ctr">
+          <a:solidFill>
+            <a:schemeClr val="phClr"/>
+          </a:solidFill>
+          <a:prstDash val="solid"/>
+          <a:miter lim="800000"/>
+        </a:ln>
+      </a:lnStyleLst>
+      <a:effectStyleLst>
+        <a:effectStyle>
+          <a:effectLst/>
+        </a:effectStyle>
+        <a:effectStyle>
+          <a:effectLst/>
+        </a:effectStyle>
+        <a:effectStyle>
+          <a:effectLst>
+            <a:outerShdw blurRad="57150" dist="19050" dir="5400000" algn="ctr" rotWithShape="0">
+              <a:srgbClr val="000000">
+                <a:alpha val="63000"/>
+              </a:srgbClr>
+            </a:outerShdw>
+          </a:effectLst>
+        </a:effectStyle>
+      </a:effectStyleLst>
+      <a:bgFillStyleLst>
+        <a:solidFill>
+          <a:schemeClr val="phClr"/>
+        </a:solidFill>
+        <a:solidFill>
+          <a:schemeClr val="phClr">
+            <a:tint val="95000"/>
+            <a:satMod val="170000"/>
+          </a:schemeClr>
+        </a:solidFill>
+        <a:gradFill rotWithShape="1">
+          <a:gsLst>
+            <a:gs pos="0">
+              <a:schemeClr val="phClr">
+                <a:tint val="93000"/>
+                <a:satMod val="150000"/>
+                <a:shade val="98000"/>
+                <a:lumMod val="102000"/>
+              </a:schemeClr>
+            </a:gs>
+            <a:gs pos="50000">
+              <a:schemeClr val="phClr">
+                <a:tint val="98000"/>
+                <a:satMod val="130000"/>
+                <a:shade val="90000"/>
+                <a:lumMod val="103000"/>
+              </a:schemeClr>
+            </a:gs>
+            <a:gs pos="100000">
+              <a:schemeClr val="phClr">
+                <a:shade val="63000"/>
+                <a:satMod val="120000"/>
+              </a:schemeClr>
+            </a:gs>
+          </a:gsLst>
+          <a:lin ang="5400000" scaled="0"/>
+        </a:gradFill>
+      </a:bgFillStyleLst>
+    </a:fmtScheme>
+  </a:themeElements>
+  <a:objectDefaults/>
+  <a:extraClrSchemeLst/>
+  <a:extLst>
+    <a:ext uri="{05A4C25C-085E-4340-85A3-A5531E510DB2}">
+      <thm15:themeFamily xmlns:thm15="http://schemas.microsoft.com/office/thememl/2012/main" name="Office Theme" id="{62F939B6-93AF-4DB8-9C6B-D6C7DFDC589F}" vid="{4A3C46E8-61CC-4603-A589-7422A47A8E4A}"/>
+    </a:ext>
+  </a:extLst>
+</a:theme>
 </file>
</xml_diff>

<commit_message>
acutally thoo now finsihed:
</commit_message>
<xml_diff>
--- a/CS-6222/Fall_2018/project/Smart City Security - Attack and Defense Strategems.pptx
+++ b/CS-6222/Fall_2018/project/Smart City Security - Attack and Defense Strategems.pptx
@@ -125,6 +125,14 @@
       </a:defRPr>
     </a:lvl9pPr>
   </p:defaultTextStyle>
+  <p:extLst>
+    <p:ext uri="{EFAFB233-063F-42B5-8137-9DF3F51BA10A}">
+      <p15:sldGuideLst xmlns:p15="http://schemas.microsoft.com/office/powerpoint/2012/main"/>
+    </p:ext>
+    <p:ext uri="{2D200454-40CA-4A62-9FC3-DE9A4176ACB9}">
+      <p15:notesGuideLst xmlns:p15="http://schemas.microsoft.com/office/powerpoint/2012/main"/>
+    </p:ext>
+  </p:extLst>
 </p:presentation>
 </file>
 
@@ -6275,6 +6283,13 @@
             </a:r>
           </a:p>
           <a:p>
+            <a:r>
+              <a:rPr lang="en-US"/>
+              <a:t>Conclusion</a:t>
+            </a:r>
+            <a:endParaRPr lang="en-US" dirty="0"/>
+          </a:p>
+          <a:p>
             <a:endParaRPr lang="en-US" dirty="0"/>
           </a:p>
         </p:txBody>
@@ -6520,8 +6535,8 @@
           </a:p>
         </p:txBody>
       </p:sp>
-      <mc:AlternateContent xmlns:mc="http://schemas.openxmlformats.org/markup-compatibility/2006">
-        <mc:Choice xmlns:a14="http://schemas.microsoft.com/office/drawing/2010/main" Requires="a14">
+      <mc:AlternateContent xmlns:mc="http://schemas.openxmlformats.org/markup-compatibility/2006" xmlns:a14="http://schemas.microsoft.com/office/drawing/2010/main">
+        <mc:Choice Requires="a14">
           <p:sp>
             <p:nvSpPr>
               <p:cNvPr id="4" name="TextBox 3">
@@ -6555,6 +6570,7 @@
               </a:bodyPr>
               <a:lstStyle/>
               <a:p>
+                <a:pPr/>
                 <a14:m>
                   <m:oMathPara xmlns:m="http://schemas.openxmlformats.org/officeDocument/2006/math">
                     <m:oMathParaPr>
@@ -6599,7 +6615,7 @@
             </p:txBody>
           </p:sp>
         </mc:Choice>
-        <mc:Fallback>
+        <mc:Fallback xmlns="">
           <p:sp>
             <p:nvSpPr>
               <p:cNvPr id="4" name="TextBox 3">

</xml_diff>

<commit_message>
formatting and got first part
</commit_message>
<xml_diff>
--- a/CS-6222/Fall_2018/project/Smart City Security - Attack and Defense Strategems.pptx
+++ b/CS-6222/Fall_2018/project/Smart City Security - Attack and Defense Strategems.pptx
@@ -230,7 +230,7 @@
           <a:p>
             <a:fld id="{885E8F64-0C78-4255-8B40-B580DC519733}" type="datetimeFigureOut">
               <a:rPr lang="en-US" smtClean="0"/>
-              <a:t>11/28/2018</a:t>
+              <a:t>12/2/2018</a:t>
             </a:fld>
             <a:endParaRPr lang="en-US"/>
           </a:p>
@@ -407,7 +407,7 @@
           <a:p>
             <a:fld id="{4A7730B9-EF85-4A21-B7AA-AEC3C5AEBAB7}" type="datetimeFigureOut">
               <a:rPr lang="en-US" smtClean="0"/>
-              <a:t>11/28/2018</a:t>
+              <a:t>12/2/2018</a:t>
             </a:fld>
             <a:endParaRPr lang="en-US"/>
           </a:p>
@@ -1705,7 +1705,7 @@
           <a:p>
             <a:fld id="{6D507E40-7F6C-4681-A6D7-35A15DCE1A73}" type="datetimeFigureOut">
               <a:rPr lang="en-US" smtClean="0"/>
-              <a:t>11/28/2018</a:t>
+              <a:t>12/2/2018</a:t>
             </a:fld>
             <a:endParaRPr lang="en-US"/>
           </a:p>
@@ -1903,7 +1903,7 @@
           <a:p>
             <a:fld id="{6D507E40-7F6C-4681-A6D7-35A15DCE1A73}" type="datetimeFigureOut">
               <a:rPr lang="en-US" smtClean="0"/>
-              <a:t>11/28/2018</a:t>
+              <a:t>12/2/2018</a:t>
             </a:fld>
             <a:endParaRPr lang="en-US"/>
           </a:p>
@@ -2111,7 +2111,7 @@
           <a:p>
             <a:fld id="{6D507E40-7F6C-4681-A6D7-35A15DCE1A73}" type="datetimeFigureOut">
               <a:rPr lang="en-US" smtClean="0"/>
-              <a:t>11/28/2018</a:t>
+              <a:t>12/2/2018</a:t>
             </a:fld>
             <a:endParaRPr lang="en-US"/>
           </a:p>
@@ -2314,7 +2314,7 @@
           <a:p>
             <a:fld id="{6D507E40-7F6C-4681-A6D7-35A15DCE1A73}" type="datetimeFigureOut">
               <a:rPr lang="en-US" smtClean="0"/>
-              <a:t>11/28/2018</a:t>
+              <a:t>12/2/2018</a:t>
             </a:fld>
             <a:endParaRPr lang="en-US"/>
           </a:p>
@@ -2589,7 +2589,7 @@
           <a:p>
             <a:fld id="{6D507E40-7F6C-4681-A6D7-35A15DCE1A73}" type="datetimeFigureOut">
               <a:rPr lang="en-US" smtClean="0"/>
-              <a:t>11/28/2018</a:t>
+              <a:t>12/2/2018</a:t>
             </a:fld>
             <a:endParaRPr lang="en-US"/>
           </a:p>
@@ -2859,7 +2859,7 @@
           <a:p>
             <a:fld id="{6D507E40-7F6C-4681-A6D7-35A15DCE1A73}" type="datetimeFigureOut">
               <a:rPr lang="en-US" smtClean="0"/>
-              <a:t>11/28/2018</a:t>
+              <a:t>12/2/2018</a:t>
             </a:fld>
             <a:endParaRPr lang="en-US"/>
           </a:p>
@@ -3271,7 +3271,7 @@
           <a:p>
             <a:fld id="{6D507E40-7F6C-4681-A6D7-35A15DCE1A73}" type="datetimeFigureOut">
               <a:rPr lang="en-US" smtClean="0"/>
-              <a:t>11/28/2018</a:t>
+              <a:t>12/2/2018</a:t>
             </a:fld>
             <a:endParaRPr lang="en-US"/>
           </a:p>
@@ -3412,7 +3412,7 @@
           <a:p>
             <a:fld id="{6D507E40-7F6C-4681-A6D7-35A15DCE1A73}" type="datetimeFigureOut">
               <a:rPr lang="en-US" smtClean="0"/>
-              <a:t>11/28/2018</a:t>
+              <a:t>12/2/2018</a:t>
             </a:fld>
             <a:endParaRPr lang="en-US"/>
           </a:p>
@@ -3525,7 +3525,7 @@
           <a:p>
             <a:fld id="{6D507E40-7F6C-4681-A6D7-35A15DCE1A73}" type="datetimeFigureOut">
               <a:rPr lang="en-US" smtClean="0"/>
-              <a:t>11/28/2018</a:t>
+              <a:t>12/2/2018</a:t>
             </a:fld>
             <a:endParaRPr lang="en-US"/>
           </a:p>
@@ -3836,7 +3836,7 @@
           <a:p>
             <a:fld id="{6D507E40-7F6C-4681-A6D7-35A15DCE1A73}" type="datetimeFigureOut">
               <a:rPr lang="en-US" smtClean="0"/>
-              <a:t>11/28/2018</a:t>
+              <a:t>12/2/2018</a:t>
             </a:fld>
             <a:endParaRPr lang="en-US"/>
           </a:p>
@@ -4124,7 +4124,7 @@
           <a:p>
             <a:fld id="{6D507E40-7F6C-4681-A6D7-35A15DCE1A73}" type="datetimeFigureOut">
               <a:rPr lang="en-US" smtClean="0"/>
-              <a:t>11/28/2018</a:t>
+              <a:t>12/2/2018</a:t>
             </a:fld>
             <a:endParaRPr lang="en-US"/>
           </a:p>
@@ -4365,7 +4365,7 @@
           <a:p>
             <a:fld id="{6D507E40-7F6C-4681-A6D7-35A15DCE1A73}" type="datetimeFigureOut">
               <a:rPr lang="en-US" smtClean="0"/>
-              <a:t>11/28/2018</a:t>
+              <a:t>12/2/2018</a:t>
             </a:fld>
             <a:endParaRPr lang="en-US"/>
           </a:p>
@@ -4820,11 +4820,18 @@
           <a:p>
             <a:pPr algn="l"/>
             <a:r>
+              <a:rPr lang="en-US">
+                <a:latin typeface="Calibri" panose="020F0502020204030204" pitchFamily="34" charset="0"/>
+                <a:cs typeface="Calibri" panose="020F0502020204030204" pitchFamily="34" charset="0"/>
+              </a:rPr>
+              <a:t>Smart Grid Security </a:t>
+            </a:r>
+            <a:r>
               <a:rPr lang="en-US" dirty="0">
                 <a:latin typeface="Calibri" panose="020F0502020204030204" pitchFamily="34" charset="0"/>
                 <a:cs typeface="Calibri" panose="020F0502020204030204" pitchFamily="34" charset="0"/>
               </a:rPr>
-              <a:t>Smart City Security – Attack and Defense Stratagems</a:t>
+              <a:t>– Attack and Defense Stratagems</a:t>
             </a:r>
           </a:p>
         </p:txBody>

</xml_diff>